<commit_message>
Updated the DG and UG for mark and unmark, add_guest was added in DG
</commit_message>
<xml_diff>
--- a/docs/diagrams/MarkUnmarkSequenceDiagram.pptx
+++ b/docs/diagrams/MarkUnmarkSequenceDiagram.pptx
@@ -10,7 +10,7 @@
   <p:sldIdLst>
     <p:sldId id="267" r:id="rId2"/>
   </p:sldIdLst>
-  <p:sldSz cx="12192000" cy="6858000"/>
+  <p:sldSz cx="9144000" cy="9315450"/>
   <p:notesSz cx="6858000" cy="9144000"/>
   <p:defaultTextStyle>
     <a:defPPr>
@@ -110,12 +110,12 @@
   <p:extLst>
     <p:ext uri="{EFAFB233-063F-42B5-8137-9DF3F51BA10A}">
       <p15:sldGuideLst xmlns:p15="http://schemas.microsoft.com/office/powerpoint/2012/main">
-        <p15:guide id="1" orient="horz" pos="1488" userDrawn="1">
+        <p15:guide id="1" orient="horz" pos="2021" userDrawn="1">
           <p15:clr>
             <a:srgbClr val="A4A3A4"/>
           </p15:clr>
         </p15:guide>
-        <p15:guide id="2" pos="3840" userDrawn="1">
+        <p15:guide id="2" pos="2880" userDrawn="1">
           <p15:clr>
             <a:srgbClr val="A4A3A4"/>
           </p15:clr>
@@ -208,7 +208,7 @@
           <a:p>
             <a:fld id="{F5CC4B3F-88C1-4FFA-B1B6-F41C21DC6924}" type="datetimeFigureOut">
               <a:rPr lang="en-US" smtClean="0"/>
-              <a:t>10/18/2018</a:t>
+              <a:t>11/12/2018</a:t>
             </a:fld>
             <a:endParaRPr lang="en-US"/>
           </a:p>
@@ -226,8 +226,8 @@
         </p:nvSpPr>
         <p:spPr>
           <a:xfrm>
-            <a:off x="381000" y="685800"/>
-            <a:ext cx="6096000" cy="3429000"/>
+            <a:off x="1746250" y="685800"/>
+            <a:ext cx="3365500" cy="3429000"/>
           </a:xfrm>
           <a:prstGeom prst="rect">
             <a:avLst/>
@@ -504,8 +504,8 @@
         </p:nvSpPr>
         <p:spPr>
           <a:xfrm>
-            <a:off x="914400" y="2130428"/>
-            <a:ext cx="10363200" cy="1470025"/>
+            <a:off x="685800" y="2893832"/>
+            <a:ext cx="7772400" cy="1996784"/>
           </a:xfrm>
         </p:spPr>
         <p:txBody>
@@ -531,8 +531,8 @@
         </p:nvSpPr>
         <p:spPr>
           <a:xfrm>
-            <a:off x="1828800" y="3886200"/>
-            <a:ext cx="8534400" cy="1752600"/>
+            <a:off x="1371600" y="5278755"/>
+            <a:ext cx="6400800" cy="2380615"/>
           </a:xfrm>
         </p:spPr>
         <p:txBody>
@@ -548,7 +548,7 @@
                 </a:solidFill>
               </a:defRPr>
             </a:lvl1pPr>
-            <a:lvl2pPr marL="457200" indent="0" algn="ctr">
+            <a:lvl2pPr marL="342900" indent="0" algn="ctr">
               <a:buNone/>
               <a:defRPr>
                 <a:solidFill>
@@ -558,7 +558,7 @@
                 </a:solidFill>
               </a:defRPr>
             </a:lvl2pPr>
-            <a:lvl3pPr marL="914400" indent="0" algn="ctr">
+            <a:lvl3pPr marL="685800" indent="0" algn="ctr">
               <a:buNone/>
               <a:defRPr>
                 <a:solidFill>
@@ -568,7 +568,7 @@
                 </a:solidFill>
               </a:defRPr>
             </a:lvl3pPr>
-            <a:lvl4pPr marL="1371600" indent="0" algn="ctr">
+            <a:lvl4pPr marL="1028700" indent="0" algn="ctr">
               <a:buNone/>
               <a:defRPr>
                 <a:solidFill>
@@ -578,7 +578,7 @@
                 </a:solidFill>
               </a:defRPr>
             </a:lvl4pPr>
-            <a:lvl5pPr marL="1828800" indent="0" algn="ctr">
+            <a:lvl5pPr marL="1371600" indent="0" algn="ctr">
               <a:buNone/>
               <a:defRPr>
                 <a:solidFill>
@@ -588,7 +588,7 @@
                 </a:solidFill>
               </a:defRPr>
             </a:lvl5pPr>
-            <a:lvl6pPr marL="2286000" indent="0" algn="ctr">
+            <a:lvl6pPr marL="1714500" indent="0" algn="ctr">
               <a:buNone/>
               <a:defRPr>
                 <a:solidFill>
@@ -598,7 +598,7 @@
                 </a:solidFill>
               </a:defRPr>
             </a:lvl6pPr>
-            <a:lvl7pPr marL="2743200" indent="0" algn="ctr">
+            <a:lvl7pPr marL="2057400" indent="0" algn="ctr">
               <a:buNone/>
               <a:defRPr>
                 <a:solidFill>
@@ -608,7 +608,7 @@
                 </a:solidFill>
               </a:defRPr>
             </a:lvl7pPr>
-            <a:lvl8pPr marL="3200400" indent="0" algn="ctr">
+            <a:lvl8pPr marL="2400300" indent="0" algn="ctr">
               <a:buNone/>
               <a:defRPr>
                 <a:solidFill>
@@ -618,7 +618,7 @@
                 </a:solidFill>
               </a:defRPr>
             </a:lvl8pPr>
-            <a:lvl9pPr marL="3657600" indent="0" algn="ctr">
+            <a:lvl9pPr marL="2743200" indent="0" algn="ctr">
               <a:buNone/>
               <a:defRPr>
                 <a:solidFill>
@@ -654,7 +654,7 @@
           <a:p>
             <a:fld id="{78C97017-6FC3-485B-9764-EAC9E56C1D49}" type="datetimeFigureOut">
               <a:rPr lang="en-US" smtClean="0"/>
-              <a:t>10/18/2018</a:t>
+              <a:t>11/12/2018</a:t>
             </a:fld>
             <a:endParaRPr lang="en-US"/>
           </a:p>
@@ -822,7 +822,7 @@
           <a:p>
             <a:fld id="{78C97017-6FC3-485B-9764-EAC9E56C1D49}" type="datetimeFigureOut">
               <a:rPr lang="en-US" smtClean="0"/>
-              <a:t>10/18/2018</a:t>
+              <a:t>11/12/2018</a:t>
             </a:fld>
             <a:endParaRPr lang="en-US"/>
           </a:p>
@@ -912,8 +912,8 @@
         </p:nvSpPr>
         <p:spPr>
           <a:xfrm>
-            <a:off x="8839200" y="274641"/>
-            <a:ext cx="2743200" cy="5851525"/>
+            <a:off x="6629400" y="373055"/>
+            <a:ext cx="2057400" cy="7948321"/>
           </a:xfrm>
         </p:spPr>
         <p:txBody>
@@ -939,8 +939,8 @@
         </p:nvSpPr>
         <p:spPr>
           <a:xfrm>
-            <a:off x="609600" y="274641"/>
-            <a:ext cx="8026400" cy="5851525"/>
+            <a:off x="457200" y="373055"/>
+            <a:ext cx="6019800" cy="7948321"/>
           </a:xfrm>
         </p:spPr>
         <p:txBody>
@@ -1000,7 +1000,7 @@
           <a:p>
             <a:fld id="{78C97017-6FC3-485B-9764-EAC9E56C1D49}" type="datetimeFigureOut">
               <a:rPr lang="en-US" smtClean="0"/>
-              <a:t>10/18/2018</a:t>
+              <a:t>11/12/2018</a:t>
             </a:fld>
             <a:endParaRPr lang="en-US"/>
           </a:p>
@@ -1168,7 +1168,7 @@
           <a:p>
             <a:fld id="{78C97017-6FC3-485B-9764-EAC9E56C1D49}" type="datetimeFigureOut">
               <a:rPr lang="en-US" smtClean="0"/>
-              <a:t>10/18/2018</a:t>
+              <a:t>11/12/2018</a:t>
             </a:fld>
             <a:endParaRPr lang="en-US"/>
           </a:p>
@@ -1258,15 +1258,15 @@
         </p:nvSpPr>
         <p:spPr>
           <a:xfrm>
-            <a:off x="963084" y="4406903"/>
-            <a:ext cx="10363200" cy="1362075"/>
+            <a:off x="722313" y="5986044"/>
+            <a:ext cx="7772400" cy="1850152"/>
           </a:xfrm>
         </p:spPr>
         <p:txBody>
           <a:bodyPr anchor="t"/>
           <a:lstStyle>
             <a:lvl1pPr algn="l">
-              <a:defRPr sz="4000" b="1" cap="all"/>
+              <a:defRPr sz="3000" b="1" cap="all"/>
             </a:lvl1pPr>
           </a:lstStyle>
           <a:p>
@@ -1289,8 +1289,8 @@
         </p:nvSpPr>
         <p:spPr>
           <a:xfrm>
-            <a:off x="963084" y="2906713"/>
-            <a:ext cx="10363200" cy="1500187"/>
+            <a:off x="722313" y="3948286"/>
+            <a:ext cx="7772400" cy="2037754"/>
           </a:xfrm>
         </p:spPr>
         <p:txBody>
@@ -1298,7 +1298,7 @@
           <a:lstStyle>
             <a:lvl1pPr marL="0" indent="0">
               <a:buNone/>
-              <a:defRPr sz="2000">
+              <a:defRPr sz="1500">
                 <a:solidFill>
                   <a:schemeClr val="tx1">
                     <a:tint val="75000"/>
@@ -1306,9 +1306,9 @@
                 </a:solidFill>
               </a:defRPr>
             </a:lvl1pPr>
-            <a:lvl2pPr marL="457200" indent="0">
+            <a:lvl2pPr marL="342900" indent="0">
               <a:buNone/>
-              <a:defRPr sz="1800">
+              <a:defRPr sz="1350">
                 <a:solidFill>
                   <a:schemeClr val="tx1">
                     <a:tint val="75000"/>
@@ -1316,9 +1316,9 @@
                 </a:solidFill>
               </a:defRPr>
             </a:lvl2pPr>
-            <a:lvl3pPr marL="914400" indent="0">
+            <a:lvl3pPr marL="685800" indent="0">
               <a:buNone/>
-              <a:defRPr sz="1600">
+              <a:defRPr sz="1200">
                 <a:solidFill>
                   <a:schemeClr val="tx1">
                     <a:tint val="75000"/>
@@ -1326,9 +1326,9 @@
                 </a:solidFill>
               </a:defRPr>
             </a:lvl3pPr>
-            <a:lvl4pPr marL="1371600" indent="0">
+            <a:lvl4pPr marL="1028700" indent="0">
               <a:buNone/>
-              <a:defRPr sz="1400">
+              <a:defRPr sz="1050">
                 <a:solidFill>
                   <a:schemeClr val="tx1">
                     <a:tint val="75000"/>
@@ -1336,9 +1336,9 @@
                 </a:solidFill>
               </a:defRPr>
             </a:lvl4pPr>
-            <a:lvl5pPr marL="1828800" indent="0">
+            <a:lvl5pPr marL="1371600" indent="0">
               <a:buNone/>
-              <a:defRPr sz="1400">
+              <a:defRPr sz="1050">
                 <a:solidFill>
                   <a:schemeClr val="tx1">
                     <a:tint val="75000"/>
@@ -1346,9 +1346,9 @@
                 </a:solidFill>
               </a:defRPr>
             </a:lvl5pPr>
-            <a:lvl6pPr marL="2286000" indent="0">
+            <a:lvl6pPr marL="1714500" indent="0">
               <a:buNone/>
-              <a:defRPr sz="1400">
+              <a:defRPr sz="1050">
                 <a:solidFill>
                   <a:schemeClr val="tx1">
                     <a:tint val="75000"/>
@@ -1356,9 +1356,9 @@
                 </a:solidFill>
               </a:defRPr>
             </a:lvl6pPr>
-            <a:lvl7pPr marL="2743200" indent="0">
+            <a:lvl7pPr marL="2057400" indent="0">
               <a:buNone/>
-              <a:defRPr sz="1400">
+              <a:defRPr sz="1050">
                 <a:solidFill>
                   <a:schemeClr val="tx1">
                     <a:tint val="75000"/>
@@ -1366,9 +1366,9 @@
                 </a:solidFill>
               </a:defRPr>
             </a:lvl7pPr>
-            <a:lvl8pPr marL="3200400" indent="0">
+            <a:lvl8pPr marL="2400300" indent="0">
               <a:buNone/>
-              <a:defRPr sz="1400">
+              <a:defRPr sz="1050">
                 <a:solidFill>
                   <a:schemeClr val="tx1">
                     <a:tint val="75000"/>
@@ -1376,9 +1376,9 @@
                 </a:solidFill>
               </a:defRPr>
             </a:lvl8pPr>
-            <a:lvl9pPr marL="3657600" indent="0">
+            <a:lvl9pPr marL="2743200" indent="0">
               <a:buNone/>
-              <a:defRPr sz="1400">
+              <a:defRPr sz="1050">
                 <a:solidFill>
                   <a:schemeClr val="tx1">
                     <a:tint val="75000"/>
@@ -1413,7 +1413,7 @@
           <a:p>
             <a:fld id="{78C97017-6FC3-485B-9764-EAC9E56C1D49}" type="datetimeFigureOut">
               <a:rPr lang="en-US" smtClean="0"/>
-              <a:t>10/18/2018</a:t>
+              <a:t>11/12/2018</a:t>
             </a:fld>
             <a:endParaRPr lang="en-US"/>
           </a:p>
@@ -1525,39 +1525,39 @@
         </p:nvSpPr>
         <p:spPr>
           <a:xfrm>
-            <a:off x="609600" y="1600203"/>
-            <a:ext cx="5384800" cy="4525963"/>
+            <a:off x="457200" y="2173610"/>
+            <a:ext cx="4038600" cy="6147766"/>
           </a:xfrm>
         </p:spPr>
         <p:txBody>
           <a:bodyPr/>
           <a:lstStyle>
             <a:lvl1pPr>
-              <a:defRPr sz="2800"/>
+              <a:defRPr sz="2100"/>
             </a:lvl1pPr>
             <a:lvl2pPr>
-              <a:defRPr sz="2400"/>
+              <a:defRPr sz="1800"/>
             </a:lvl2pPr>
             <a:lvl3pPr>
-              <a:defRPr sz="2000"/>
+              <a:defRPr sz="1500"/>
             </a:lvl3pPr>
             <a:lvl4pPr>
-              <a:defRPr sz="1800"/>
+              <a:defRPr sz="1350"/>
             </a:lvl4pPr>
             <a:lvl5pPr>
-              <a:defRPr sz="1800"/>
+              <a:defRPr sz="1350"/>
             </a:lvl5pPr>
             <a:lvl6pPr>
-              <a:defRPr sz="1800"/>
+              <a:defRPr sz="1350"/>
             </a:lvl6pPr>
             <a:lvl7pPr>
-              <a:defRPr sz="1800"/>
+              <a:defRPr sz="1350"/>
             </a:lvl7pPr>
             <a:lvl8pPr>
-              <a:defRPr sz="1800"/>
+              <a:defRPr sz="1350"/>
             </a:lvl8pPr>
             <a:lvl9pPr>
-              <a:defRPr sz="1800"/>
+              <a:defRPr sz="1350"/>
             </a:lvl9pPr>
           </a:lstStyle>
           <a:p>
@@ -1609,39 +1609,39 @@
         </p:nvSpPr>
         <p:spPr>
           <a:xfrm>
-            <a:off x="6197600" y="1600203"/>
-            <a:ext cx="5384800" cy="4525963"/>
+            <a:off x="4648200" y="2173610"/>
+            <a:ext cx="4038600" cy="6147766"/>
           </a:xfrm>
         </p:spPr>
         <p:txBody>
           <a:bodyPr/>
           <a:lstStyle>
             <a:lvl1pPr>
-              <a:defRPr sz="2800"/>
+              <a:defRPr sz="2100"/>
             </a:lvl1pPr>
             <a:lvl2pPr>
-              <a:defRPr sz="2400"/>
+              <a:defRPr sz="1800"/>
             </a:lvl2pPr>
             <a:lvl3pPr>
-              <a:defRPr sz="2000"/>
+              <a:defRPr sz="1500"/>
             </a:lvl3pPr>
             <a:lvl4pPr>
-              <a:defRPr sz="1800"/>
+              <a:defRPr sz="1350"/>
             </a:lvl4pPr>
             <a:lvl5pPr>
-              <a:defRPr sz="1800"/>
+              <a:defRPr sz="1350"/>
             </a:lvl5pPr>
             <a:lvl6pPr>
-              <a:defRPr sz="1800"/>
+              <a:defRPr sz="1350"/>
             </a:lvl6pPr>
             <a:lvl7pPr>
-              <a:defRPr sz="1800"/>
+              <a:defRPr sz="1350"/>
             </a:lvl7pPr>
             <a:lvl8pPr>
-              <a:defRPr sz="1800"/>
+              <a:defRPr sz="1350"/>
             </a:lvl8pPr>
             <a:lvl9pPr>
-              <a:defRPr sz="1800"/>
+              <a:defRPr sz="1350"/>
             </a:lvl9pPr>
           </a:lstStyle>
           <a:p>
@@ -1698,7 +1698,7 @@
           <a:p>
             <a:fld id="{78C97017-6FC3-485B-9764-EAC9E56C1D49}" type="datetimeFigureOut">
               <a:rPr lang="en-US" smtClean="0"/>
-              <a:t>10/18/2018</a:t>
+              <a:t>11/12/2018</a:t>
             </a:fld>
             <a:endParaRPr lang="en-US"/>
           </a:p>
@@ -1814,8 +1814,8 @@
         </p:nvSpPr>
         <p:spPr>
           <a:xfrm>
-            <a:off x="609600" y="1535113"/>
-            <a:ext cx="5386917" cy="639762"/>
+            <a:off x="457200" y="2085195"/>
+            <a:ext cx="4040188" cy="869010"/>
           </a:xfrm>
         </p:spPr>
         <p:txBody>
@@ -1823,39 +1823,39 @@
           <a:lstStyle>
             <a:lvl1pPr marL="0" indent="0">
               <a:buNone/>
-              <a:defRPr sz="2400" b="1"/>
+              <a:defRPr sz="1800" b="1"/>
             </a:lvl1pPr>
-            <a:lvl2pPr marL="457200" indent="0">
+            <a:lvl2pPr marL="342900" indent="0">
               <a:buNone/>
-              <a:defRPr sz="2000" b="1"/>
+              <a:defRPr sz="1500" b="1"/>
             </a:lvl2pPr>
-            <a:lvl3pPr marL="914400" indent="0">
+            <a:lvl3pPr marL="685800" indent="0">
               <a:buNone/>
-              <a:defRPr sz="1800" b="1"/>
+              <a:defRPr sz="1350" b="1"/>
             </a:lvl3pPr>
-            <a:lvl4pPr marL="1371600" indent="0">
+            <a:lvl4pPr marL="1028700" indent="0">
               <a:buNone/>
-              <a:defRPr sz="1600" b="1"/>
+              <a:defRPr sz="1200" b="1"/>
             </a:lvl4pPr>
-            <a:lvl5pPr marL="1828800" indent="0">
+            <a:lvl5pPr marL="1371600" indent="0">
               <a:buNone/>
-              <a:defRPr sz="1600" b="1"/>
+              <a:defRPr sz="1200" b="1"/>
             </a:lvl5pPr>
-            <a:lvl6pPr marL="2286000" indent="0">
+            <a:lvl6pPr marL="1714500" indent="0">
               <a:buNone/>
-              <a:defRPr sz="1600" b="1"/>
+              <a:defRPr sz="1200" b="1"/>
             </a:lvl6pPr>
-            <a:lvl7pPr marL="2743200" indent="0">
+            <a:lvl7pPr marL="2057400" indent="0">
               <a:buNone/>
-              <a:defRPr sz="1600" b="1"/>
+              <a:defRPr sz="1200" b="1"/>
             </a:lvl7pPr>
-            <a:lvl8pPr marL="3200400" indent="0">
+            <a:lvl8pPr marL="2400300" indent="0">
               <a:buNone/>
-              <a:defRPr sz="1600" b="1"/>
+              <a:defRPr sz="1200" b="1"/>
             </a:lvl8pPr>
-            <a:lvl9pPr marL="3657600" indent="0">
+            <a:lvl9pPr marL="2743200" indent="0">
               <a:buNone/>
-              <a:defRPr sz="1600" b="1"/>
+              <a:defRPr sz="1200" b="1"/>
             </a:lvl9pPr>
           </a:lstStyle>
           <a:p>
@@ -1879,39 +1879,39 @@
         </p:nvSpPr>
         <p:spPr>
           <a:xfrm>
-            <a:off x="609600" y="2174875"/>
-            <a:ext cx="5386917" cy="3951288"/>
+            <a:off x="457200" y="2954205"/>
+            <a:ext cx="4040188" cy="5367166"/>
           </a:xfrm>
         </p:spPr>
         <p:txBody>
           <a:bodyPr/>
           <a:lstStyle>
             <a:lvl1pPr>
-              <a:defRPr sz="2400"/>
+              <a:defRPr sz="1800"/>
             </a:lvl1pPr>
             <a:lvl2pPr>
-              <a:defRPr sz="2000"/>
+              <a:defRPr sz="1500"/>
             </a:lvl2pPr>
             <a:lvl3pPr>
-              <a:defRPr sz="1800"/>
+              <a:defRPr sz="1350"/>
             </a:lvl3pPr>
             <a:lvl4pPr>
-              <a:defRPr sz="1600"/>
+              <a:defRPr sz="1200"/>
             </a:lvl4pPr>
             <a:lvl5pPr>
-              <a:defRPr sz="1600"/>
+              <a:defRPr sz="1200"/>
             </a:lvl5pPr>
             <a:lvl6pPr>
-              <a:defRPr sz="1600"/>
+              <a:defRPr sz="1200"/>
             </a:lvl6pPr>
             <a:lvl7pPr>
-              <a:defRPr sz="1600"/>
+              <a:defRPr sz="1200"/>
             </a:lvl7pPr>
             <a:lvl8pPr>
-              <a:defRPr sz="1600"/>
+              <a:defRPr sz="1200"/>
             </a:lvl8pPr>
             <a:lvl9pPr>
-              <a:defRPr sz="1600"/>
+              <a:defRPr sz="1200"/>
             </a:lvl9pPr>
           </a:lstStyle>
           <a:p>
@@ -1963,8 +1963,8 @@
         </p:nvSpPr>
         <p:spPr>
           <a:xfrm>
-            <a:off x="6193369" y="1535113"/>
-            <a:ext cx="5389033" cy="639762"/>
+            <a:off x="4645027" y="2085195"/>
+            <a:ext cx="4041775" cy="869010"/>
           </a:xfrm>
         </p:spPr>
         <p:txBody>
@@ -1972,39 +1972,39 @@
           <a:lstStyle>
             <a:lvl1pPr marL="0" indent="0">
               <a:buNone/>
-              <a:defRPr sz="2400" b="1"/>
+              <a:defRPr sz="1800" b="1"/>
             </a:lvl1pPr>
-            <a:lvl2pPr marL="457200" indent="0">
+            <a:lvl2pPr marL="342900" indent="0">
               <a:buNone/>
-              <a:defRPr sz="2000" b="1"/>
+              <a:defRPr sz="1500" b="1"/>
             </a:lvl2pPr>
-            <a:lvl3pPr marL="914400" indent="0">
+            <a:lvl3pPr marL="685800" indent="0">
               <a:buNone/>
-              <a:defRPr sz="1800" b="1"/>
+              <a:defRPr sz="1350" b="1"/>
             </a:lvl3pPr>
-            <a:lvl4pPr marL="1371600" indent="0">
+            <a:lvl4pPr marL="1028700" indent="0">
               <a:buNone/>
-              <a:defRPr sz="1600" b="1"/>
+              <a:defRPr sz="1200" b="1"/>
             </a:lvl4pPr>
-            <a:lvl5pPr marL="1828800" indent="0">
+            <a:lvl5pPr marL="1371600" indent="0">
               <a:buNone/>
-              <a:defRPr sz="1600" b="1"/>
+              <a:defRPr sz="1200" b="1"/>
             </a:lvl5pPr>
-            <a:lvl6pPr marL="2286000" indent="0">
+            <a:lvl6pPr marL="1714500" indent="0">
               <a:buNone/>
-              <a:defRPr sz="1600" b="1"/>
+              <a:defRPr sz="1200" b="1"/>
             </a:lvl6pPr>
-            <a:lvl7pPr marL="2743200" indent="0">
+            <a:lvl7pPr marL="2057400" indent="0">
               <a:buNone/>
-              <a:defRPr sz="1600" b="1"/>
+              <a:defRPr sz="1200" b="1"/>
             </a:lvl7pPr>
-            <a:lvl8pPr marL="3200400" indent="0">
+            <a:lvl8pPr marL="2400300" indent="0">
               <a:buNone/>
-              <a:defRPr sz="1600" b="1"/>
+              <a:defRPr sz="1200" b="1"/>
             </a:lvl8pPr>
-            <a:lvl9pPr marL="3657600" indent="0">
+            <a:lvl9pPr marL="2743200" indent="0">
               <a:buNone/>
-              <a:defRPr sz="1600" b="1"/>
+              <a:defRPr sz="1200" b="1"/>
             </a:lvl9pPr>
           </a:lstStyle>
           <a:p>
@@ -2028,39 +2028,39 @@
         </p:nvSpPr>
         <p:spPr>
           <a:xfrm>
-            <a:off x="6193369" y="2174875"/>
-            <a:ext cx="5389033" cy="3951288"/>
+            <a:off x="4645027" y="2954205"/>
+            <a:ext cx="4041775" cy="5367166"/>
           </a:xfrm>
         </p:spPr>
         <p:txBody>
           <a:bodyPr/>
           <a:lstStyle>
             <a:lvl1pPr>
-              <a:defRPr sz="2400"/>
+              <a:defRPr sz="1800"/>
             </a:lvl1pPr>
             <a:lvl2pPr>
-              <a:defRPr sz="2000"/>
+              <a:defRPr sz="1500"/>
             </a:lvl2pPr>
             <a:lvl3pPr>
-              <a:defRPr sz="1800"/>
+              <a:defRPr sz="1350"/>
             </a:lvl3pPr>
             <a:lvl4pPr>
-              <a:defRPr sz="1600"/>
+              <a:defRPr sz="1200"/>
             </a:lvl4pPr>
             <a:lvl5pPr>
-              <a:defRPr sz="1600"/>
+              <a:defRPr sz="1200"/>
             </a:lvl5pPr>
             <a:lvl6pPr>
-              <a:defRPr sz="1600"/>
+              <a:defRPr sz="1200"/>
             </a:lvl6pPr>
             <a:lvl7pPr>
-              <a:defRPr sz="1600"/>
+              <a:defRPr sz="1200"/>
             </a:lvl7pPr>
             <a:lvl8pPr>
-              <a:defRPr sz="1600"/>
+              <a:defRPr sz="1200"/>
             </a:lvl8pPr>
             <a:lvl9pPr>
-              <a:defRPr sz="1600"/>
+              <a:defRPr sz="1200"/>
             </a:lvl9pPr>
           </a:lstStyle>
           <a:p>
@@ -2117,7 +2117,7 @@
           <a:p>
             <a:fld id="{78C97017-6FC3-485B-9764-EAC9E56C1D49}" type="datetimeFigureOut">
               <a:rPr lang="en-US" smtClean="0"/>
-              <a:t>10/18/2018</a:t>
+              <a:t>11/12/2018</a:t>
             </a:fld>
             <a:endParaRPr lang="en-US"/>
           </a:p>
@@ -2234,7 +2234,7 @@
           <a:p>
             <a:fld id="{78C97017-6FC3-485B-9764-EAC9E56C1D49}" type="datetimeFigureOut">
               <a:rPr lang="en-US" smtClean="0"/>
-              <a:t>10/18/2018</a:t>
+              <a:t>11/12/2018</a:t>
             </a:fld>
             <a:endParaRPr lang="en-US"/>
           </a:p>
@@ -2329,7 +2329,7 @@
           <a:p>
             <a:fld id="{78C97017-6FC3-485B-9764-EAC9E56C1D49}" type="datetimeFigureOut">
               <a:rPr lang="en-US" smtClean="0"/>
-              <a:t>10/18/2018</a:t>
+              <a:t>11/12/2018</a:t>
             </a:fld>
             <a:endParaRPr lang="en-US"/>
           </a:p>
@@ -2419,15 +2419,15 @@
         </p:nvSpPr>
         <p:spPr>
           <a:xfrm>
-            <a:off x="609602" y="273050"/>
-            <a:ext cx="4011084" cy="1162050"/>
+            <a:off x="457202" y="370893"/>
+            <a:ext cx="3008313" cy="1578451"/>
           </a:xfrm>
         </p:spPr>
         <p:txBody>
           <a:bodyPr anchor="b"/>
           <a:lstStyle>
             <a:lvl1pPr algn="l">
-              <a:defRPr sz="2000" b="1"/>
+              <a:defRPr sz="1500" b="1"/>
             </a:lvl1pPr>
           </a:lstStyle>
           <a:p>
@@ -2450,39 +2450,39 @@
         </p:nvSpPr>
         <p:spPr>
           <a:xfrm>
-            <a:off x="4766733" y="273053"/>
-            <a:ext cx="6815667" cy="5853113"/>
+            <a:off x="3575050" y="370898"/>
+            <a:ext cx="5111750" cy="7950478"/>
           </a:xfrm>
         </p:spPr>
         <p:txBody>
           <a:bodyPr/>
           <a:lstStyle>
             <a:lvl1pPr>
-              <a:defRPr sz="3200"/>
+              <a:defRPr sz="2400"/>
             </a:lvl1pPr>
             <a:lvl2pPr>
-              <a:defRPr sz="2800"/>
+              <a:defRPr sz="2100"/>
             </a:lvl2pPr>
             <a:lvl3pPr>
-              <a:defRPr sz="2400"/>
+              <a:defRPr sz="1800"/>
             </a:lvl3pPr>
             <a:lvl4pPr>
-              <a:defRPr sz="2000"/>
+              <a:defRPr sz="1500"/>
             </a:lvl4pPr>
             <a:lvl5pPr>
-              <a:defRPr sz="2000"/>
+              <a:defRPr sz="1500"/>
             </a:lvl5pPr>
             <a:lvl6pPr>
-              <a:defRPr sz="2000"/>
+              <a:defRPr sz="1500"/>
             </a:lvl6pPr>
             <a:lvl7pPr>
-              <a:defRPr sz="2000"/>
+              <a:defRPr sz="1500"/>
             </a:lvl7pPr>
             <a:lvl8pPr>
-              <a:defRPr sz="2000"/>
+              <a:defRPr sz="1500"/>
             </a:lvl8pPr>
             <a:lvl9pPr>
-              <a:defRPr sz="2000"/>
+              <a:defRPr sz="1500"/>
             </a:lvl9pPr>
           </a:lstStyle>
           <a:p>
@@ -2534,8 +2534,8 @@
         </p:nvSpPr>
         <p:spPr>
           <a:xfrm>
-            <a:off x="609602" y="1435103"/>
-            <a:ext cx="4011084" cy="4691063"/>
+            <a:off x="457202" y="1949349"/>
+            <a:ext cx="3008313" cy="6372027"/>
           </a:xfrm>
         </p:spPr>
         <p:txBody>
@@ -2543,39 +2543,39 @@
           <a:lstStyle>
             <a:lvl1pPr marL="0" indent="0">
               <a:buNone/>
-              <a:defRPr sz="1400"/>
+              <a:defRPr sz="1050"/>
             </a:lvl1pPr>
-            <a:lvl2pPr marL="457200" indent="0">
-              <a:buNone/>
-              <a:defRPr sz="1200"/>
-            </a:lvl2pPr>
-            <a:lvl3pPr marL="914400" indent="0">
-              <a:buNone/>
-              <a:defRPr sz="1000"/>
-            </a:lvl3pPr>
-            <a:lvl4pPr marL="1371600" indent="0">
+            <a:lvl2pPr marL="342900" indent="0">
               <a:buNone/>
               <a:defRPr sz="900"/>
+            </a:lvl2pPr>
+            <a:lvl3pPr marL="685800" indent="0">
+              <a:buNone/>
+              <a:defRPr sz="750"/>
+            </a:lvl3pPr>
+            <a:lvl4pPr marL="1028700" indent="0">
+              <a:buNone/>
+              <a:defRPr sz="675"/>
             </a:lvl4pPr>
-            <a:lvl5pPr marL="1828800" indent="0">
+            <a:lvl5pPr marL="1371600" indent="0">
               <a:buNone/>
-              <a:defRPr sz="900"/>
+              <a:defRPr sz="675"/>
             </a:lvl5pPr>
-            <a:lvl6pPr marL="2286000" indent="0">
+            <a:lvl6pPr marL="1714500" indent="0">
               <a:buNone/>
-              <a:defRPr sz="900"/>
+              <a:defRPr sz="675"/>
             </a:lvl6pPr>
-            <a:lvl7pPr marL="2743200" indent="0">
+            <a:lvl7pPr marL="2057400" indent="0">
               <a:buNone/>
-              <a:defRPr sz="900"/>
+              <a:defRPr sz="675"/>
             </a:lvl7pPr>
-            <a:lvl8pPr marL="3200400" indent="0">
+            <a:lvl8pPr marL="2400300" indent="0">
               <a:buNone/>
-              <a:defRPr sz="900"/>
+              <a:defRPr sz="675"/>
             </a:lvl8pPr>
-            <a:lvl9pPr marL="3657600" indent="0">
+            <a:lvl9pPr marL="2743200" indent="0">
               <a:buNone/>
-              <a:defRPr sz="900"/>
+              <a:defRPr sz="675"/>
             </a:lvl9pPr>
           </a:lstStyle>
           <a:p>
@@ -2604,7 +2604,7 @@
           <a:p>
             <a:fld id="{78C97017-6FC3-485B-9764-EAC9E56C1D49}" type="datetimeFigureOut">
               <a:rPr lang="en-US" smtClean="0"/>
-              <a:t>10/18/2018</a:t>
+              <a:t>11/12/2018</a:t>
             </a:fld>
             <a:endParaRPr lang="en-US"/>
           </a:p>
@@ -2694,15 +2694,15 @@
         </p:nvSpPr>
         <p:spPr>
           <a:xfrm>
-            <a:off x="2389717" y="4800600"/>
-            <a:ext cx="7315200" cy="566738"/>
+            <a:off x="1792288" y="6520815"/>
+            <a:ext cx="5486400" cy="769819"/>
           </a:xfrm>
         </p:spPr>
         <p:txBody>
           <a:bodyPr anchor="b"/>
           <a:lstStyle>
             <a:lvl1pPr algn="l">
-              <a:defRPr sz="2000" b="1"/>
+              <a:defRPr sz="1500" b="1"/>
             </a:lvl1pPr>
           </a:lstStyle>
           <a:p>
@@ -2725,8 +2725,8 @@
         </p:nvSpPr>
         <p:spPr>
           <a:xfrm>
-            <a:off x="2389717" y="612775"/>
-            <a:ext cx="7315200" cy="4114800"/>
+            <a:off x="1792288" y="832353"/>
+            <a:ext cx="5486400" cy="5589270"/>
           </a:xfrm>
         </p:spPr>
         <p:txBody>
@@ -2734,39 +2734,39 @@
           <a:lstStyle>
             <a:lvl1pPr marL="0" indent="0">
               <a:buNone/>
-              <a:defRPr sz="3200"/>
+              <a:defRPr sz="2400"/>
             </a:lvl1pPr>
-            <a:lvl2pPr marL="457200" indent="0">
+            <a:lvl2pPr marL="342900" indent="0">
               <a:buNone/>
-              <a:defRPr sz="2800"/>
+              <a:defRPr sz="2100"/>
             </a:lvl2pPr>
-            <a:lvl3pPr marL="914400" indent="0">
+            <a:lvl3pPr marL="685800" indent="0">
               <a:buNone/>
-              <a:defRPr sz="2400"/>
+              <a:defRPr sz="1800"/>
             </a:lvl3pPr>
-            <a:lvl4pPr marL="1371600" indent="0">
+            <a:lvl4pPr marL="1028700" indent="0">
               <a:buNone/>
-              <a:defRPr sz="2000"/>
+              <a:defRPr sz="1500"/>
             </a:lvl4pPr>
-            <a:lvl5pPr marL="1828800" indent="0">
+            <a:lvl5pPr marL="1371600" indent="0">
               <a:buNone/>
-              <a:defRPr sz="2000"/>
+              <a:defRPr sz="1500"/>
             </a:lvl5pPr>
-            <a:lvl6pPr marL="2286000" indent="0">
+            <a:lvl6pPr marL="1714500" indent="0">
               <a:buNone/>
-              <a:defRPr sz="2000"/>
+              <a:defRPr sz="1500"/>
             </a:lvl6pPr>
-            <a:lvl7pPr marL="2743200" indent="0">
+            <a:lvl7pPr marL="2057400" indent="0">
               <a:buNone/>
-              <a:defRPr sz="2000"/>
+              <a:defRPr sz="1500"/>
             </a:lvl7pPr>
-            <a:lvl8pPr marL="3200400" indent="0">
+            <a:lvl8pPr marL="2400300" indent="0">
               <a:buNone/>
-              <a:defRPr sz="2000"/>
+              <a:defRPr sz="1500"/>
             </a:lvl8pPr>
-            <a:lvl9pPr marL="3657600" indent="0">
+            <a:lvl9pPr marL="2743200" indent="0">
               <a:buNone/>
-              <a:defRPr sz="2000"/>
+              <a:defRPr sz="1500"/>
             </a:lvl9pPr>
           </a:lstStyle>
           <a:p>
@@ -2786,8 +2786,8 @@
         </p:nvSpPr>
         <p:spPr>
           <a:xfrm>
-            <a:off x="2389717" y="5367338"/>
-            <a:ext cx="7315200" cy="804862"/>
+            <a:off x="1792288" y="7290634"/>
+            <a:ext cx="5486400" cy="1093271"/>
           </a:xfrm>
         </p:spPr>
         <p:txBody>
@@ -2795,39 +2795,39 @@
           <a:lstStyle>
             <a:lvl1pPr marL="0" indent="0">
               <a:buNone/>
-              <a:defRPr sz="1400"/>
+              <a:defRPr sz="1050"/>
             </a:lvl1pPr>
-            <a:lvl2pPr marL="457200" indent="0">
-              <a:buNone/>
-              <a:defRPr sz="1200"/>
-            </a:lvl2pPr>
-            <a:lvl3pPr marL="914400" indent="0">
-              <a:buNone/>
-              <a:defRPr sz="1000"/>
-            </a:lvl3pPr>
-            <a:lvl4pPr marL="1371600" indent="0">
+            <a:lvl2pPr marL="342900" indent="0">
               <a:buNone/>
               <a:defRPr sz="900"/>
+            </a:lvl2pPr>
+            <a:lvl3pPr marL="685800" indent="0">
+              <a:buNone/>
+              <a:defRPr sz="750"/>
+            </a:lvl3pPr>
+            <a:lvl4pPr marL="1028700" indent="0">
+              <a:buNone/>
+              <a:defRPr sz="675"/>
             </a:lvl4pPr>
-            <a:lvl5pPr marL="1828800" indent="0">
+            <a:lvl5pPr marL="1371600" indent="0">
               <a:buNone/>
-              <a:defRPr sz="900"/>
+              <a:defRPr sz="675"/>
             </a:lvl5pPr>
-            <a:lvl6pPr marL="2286000" indent="0">
+            <a:lvl6pPr marL="1714500" indent="0">
               <a:buNone/>
-              <a:defRPr sz="900"/>
+              <a:defRPr sz="675"/>
             </a:lvl6pPr>
-            <a:lvl7pPr marL="2743200" indent="0">
+            <a:lvl7pPr marL="2057400" indent="0">
               <a:buNone/>
-              <a:defRPr sz="900"/>
+              <a:defRPr sz="675"/>
             </a:lvl7pPr>
-            <a:lvl8pPr marL="3200400" indent="0">
+            <a:lvl8pPr marL="2400300" indent="0">
               <a:buNone/>
-              <a:defRPr sz="900"/>
+              <a:defRPr sz="675"/>
             </a:lvl8pPr>
-            <a:lvl9pPr marL="3657600" indent="0">
+            <a:lvl9pPr marL="2743200" indent="0">
               <a:buNone/>
-              <a:defRPr sz="900"/>
+              <a:defRPr sz="675"/>
             </a:lvl9pPr>
           </a:lstStyle>
           <a:p>
@@ -2856,7 +2856,7 @@
           <a:p>
             <a:fld id="{78C97017-6FC3-485B-9764-EAC9E56C1D49}" type="datetimeFigureOut">
               <a:rPr lang="en-US" smtClean="0"/>
-              <a:t>10/18/2018</a:t>
+              <a:t>11/12/2018</a:t>
             </a:fld>
             <a:endParaRPr lang="en-US"/>
           </a:p>
@@ -2951,8 +2951,8 @@
         </p:nvSpPr>
         <p:spPr>
           <a:xfrm>
-            <a:off x="609600" y="274638"/>
-            <a:ext cx="10972800" cy="1143000"/>
+            <a:off x="457200" y="373050"/>
+            <a:ext cx="8229600" cy="1552575"/>
           </a:xfrm>
           <a:prstGeom prst="rect">
             <a:avLst/>
@@ -2983,8 +2983,8 @@
         </p:nvSpPr>
         <p:spPr>
           <a:xfrm>
-            <a:off x="609600" y="1600203"/>
-            <a:ext cx="10972800" cy="4525963"/>
+            <a:off x="457200" y="2173610"/>
+            <a:ext cx="8229600" cy="6147766"/>
           </a:xfrm>
           <a:prstGeom prst="rect">
             <a:avLst/>
@@ -3044,8 +3044,8 @@
         </p:nvSpPr>
         <p:spPr>
           <a:xfrm>
-            <a:off x="609600" y="6356353"/>
-            <a:ext cx="2844800" cy="365125"/>
+            <a:off x="457200" y="8634047"/>
+            <a:ext cx="2133600" cy="495961"/>
           </a:xfrm>
           <a:prstGeom prst="rect">
             <a:avLst/>
@@ -3055,7 +3055,7 @@
           <a:bodyPr vert="horz" lIns="91440" tIns="45720" rIns="91440" bIns="45720" rtlCol="0" anchor="ctr"/>
           <a:lstStyle>
             <a:lvl1pPr algn="l">
-              <a:defRPr sz="1200">
+              <a:defRPr sz="900">
                 <a:solidFill>
                   <a:schemeClr val="tx1">
                     <a:tint val="75000"/>
@@ -3067,7 +3067,7 @@
           <a:p>
             <a:fld id="{78C97017-6FC3-485B-9764-EAC9E56C1D49}" type="datetimeFigureOut">
               <a:rPr lang="en-US" smtClean="0"/>
-              <a:t>10/18/2018</a:t>
+              <a:t>11/12/2018</a:t>
             </a:fld>
             <a:endParaRPr lang="en-US"/>
           </a:p>
@@ -3085,8 +3085,8 @@
         </p:nvSpPr>
         <p:spPr>
           <a:xfrm>
-            <a:off x="4165600" y="6356353"/>
-            <a:ext cx="3860800" cy="365125"/>
+            <a:off x="3124200" y="8634047"/>
+            <a:ext cx="2895600" cy="495961"/>
           </a:xfrm>
           <a:prstGeom prst="rect">
             <a:avLst/>
@@ -3096,7 +3096,7 @@
           <a:bodyPr vert="horz" lIns="91440" tIns="45720" rIns="91440" bIns="45720" rtlCol="0" anchor="ctr"/>
           <a:lstStyle>
             <a:lvl1pPr algn="ctr">
-              <a:defRPr sz="1200">
+              <a:defRPr sz="900">
                 <a:solidFill>
                   <a:schemeClr val="tx1">
                     <a:tint val="75000"/>
@@ -3122,8 +3122,8 @@
         </p:nvSpPr>
         <p:spPr>
           <a:xfrm>
-            <a:off x="8737600" y="6356353"/>
-            <a:ext cx="2844800" cy="365125"/>
+            <a:off x="6553200" y="8634047"/>
+            <a:ext cx="2133600" cy="495961"/>
           </a:xfrm>
           <a:prstGeom prst="rect">
             <a:avLst/>
@@ -3133,7 +3133,7 @@
           <a:bodyPr vert="horz" lIns="91440" tIns="45720" rIns="91440" bIns="45720" rtlCol="0" anchor="ctr"/>
           <a:lstStyle>
             <a:lvl1pPr algn="r">
-              <a:defRPr sz="1200">
+              <a:defRPr sz="900">
                 <a:solidFill>
                   <a:schemeClr val="tx1">
                     <a:tint val="75000"/>
@@ -3174,12 +3174,12 @@
   </p:sldLayoutIdLst>
   <p:txStyles>
     <p:titleStyle>
-      <a:lvl1pPr algn="ctr" defTabSz="914400" rtl="0" eaLnBrk="1" latinLnBrk="0" hangingPunct="1">
+      <a:lvl1pPr algn="ctr" defTabSz="685800" rtl="0" eaLnBrk="1" latinLnBrk="0" hangingPunct="1">
         <a:spcBef>
           <a:spcPct val="0"/>
         </a:spcBef>
         <a:buNone/>
-        <a:defRPr sz="4400" kern="1200">
+        <a:defRPr sz="3300" kern="1200">
           <a:solidFill>
             <a:schemeClr val="tx1"/>
           </a:solidFill>
@@ -3190,37 +3190,7 @@
       </a:lvl1pPr>
     </p:titleStyle>
     <p:bodyStyle>
-      <a:lvl1pPr marL="342900" indent="-342900" algn="l" defTabSz="914400" rtl="0" eaLnBrk="1" latinLnBrk="0" hangingPunct="1">
-        <a:spcBef>
-          <a:spcPct val="20000"/>
-        </a:spcBef>
-        <a:buFont typeface="Arial" panose="020B0604020202020204" pitchFamily="34" charset="0"/>
-        <a:buChar char="•"/>
-        <a:defRPr sz="3200" kern="1200">
-          <a:solidFill>
-            <a:schemeClr val="tx1"/>
-          </a:solidFill>
-          <a:latin typeface="+mn-lt"/>
-          <a:ea typeface="+mn-ea"/>
-          <a:cs typeface="+mn-cs"/>
-        </a:defRPr>
-      </a:lvl1pPr>
-      <a:lvl2pPr marL="742950" indent="-285750" algn="l" defTabSz="914400" rtl="0" eaLnBrk="1" latinLnBrk="0" hangingPunct="1">
-        <a:spcBef>
-          <a:spcPct val="20000"/>
-        </a:spcBef>
-        <a:buFont typeface="Arial" panose="020B0604020202020204" pitchFamily="34" charset="0"/>
-        <a:buChar char="–"/>
-        <a:defRPr sz="2800" kern="1200">
-          <a:solidFill>
-            <a:schemeClr val="tx1"/>
-          </a:solidFill>
-          <a:latin typeface="+mn-lt"/>
-          <a:ea typeface="+mn-ea"/>
-          <a:cs typeface="+mn-cs"/>
-        </a:defRPr>
-      </a:lvl2pPr>
-      <a:lvl3pPr marL="1143000" indent="-228600" algn="l" defTabSz="914400" rtl="0" eaLnBrk="1" latinLnBrk="0" hangingPunct="1">
+      <a:lvl1pPr marL="257175" indent="-257175" algn="l" defTabSz="685800" rtl="0" eaLnBrk="1" latinLnBrk="0" hangingPunct="1">
         <a:spcBef>
           <a:spcPct val="20000"/>
         </a:spcBef>
@@ -3234,14 +3204,44 @@
           <a:ea typeface="+mn-ea"/>
           <a:cs typeface="+mn-cs"/>
         </a:defRPr>
-      </a:lvl3pPr>
-      <a:lvl4pPr marL="1600200" indent="-228600" algn="l" defTabSz="914400" rtl="0" eaLnBrk="1" latinLnBrk="0" hangingPunct="1">
+      </a:lvl1pPr>
+      <a:lvl2pPr marL="557213" indent="-214313" algn="l" defTabSz="685800" rtl="0" eaLnBrk="1" latinLnBrk="0" hangingPunct="1">
         <a:spcBef>
           <a:spcPct val="20000"/>
         </a:spcBef>
         <a:buFont typeface="Arial" panose="020B0604020202020204" pitchFamily="34" charset="0"/>
         <a:buChar char="–"/>
-        <a:defRPr sz="2000" kern="1200">
+        <a:defRPr sz="2100" kern="1200">
+          <a:solidFill>
+            <a:schemeClr val="tx1"/>
+          </a:solidFill>
+          <a:latin typeface="+mn-lt"/>
+          <a:ea typeface="+mn-ea"/>
+          <a:cs typeface="+mn-cs"/>
+        </a:defRPr>
+      </a:lvl2pPr>
+      <a:lvl3pPr marL="857250" indent="-171450" algn="l" defTabSz="685800" rtl="0" eaLnBrk="1" latinLnBrk="0" hangingPunct="1">
+        <a:spcBef>
+          <a:spcPct val="20000"/>
+        </a:spcBef>
+        <a:buFont typeface="Arial" panose="020B0604020202020204" pitchFamily="34" charset="0"/>
+        <a:buChar char="•"/>
+        <a:defRPr sz="1800" kern="1200">
+          <a:solidFill>
+            <a:schemeClr val="tx1"/>
+          </a:solidFill>
+          <a:latin typeface="+mn-lt"/>
+          <a:ea typeface="+mn-ea"/>
+          <a:cs typeface="+mn-cs"/>
+        </a:defRPr>
+      </a:lvl3pPr>
+      <a:lvl4pPr marL="1200150" indent="-171450" algn="l" defTabSz="685800" rtl="0" eaLnBrk="1" latinLnBrk="0" hangingPunct="1">
+        <a:spcBef>
+          <a:spcPct val="20000"/>
+        </a:spcBef>
+        <a:buFont typeface="Arial" panose="020B0604020202020204" pitchFamily="34" charset="0"/>
+        <a:buChar char="–"/>
+        <a:defRPr sz="1500" kern="1200">
           <a:solidFill>
             <a:schemeClr val="tx1"/>
           </a:solidFill>
@@ -3250,13 +3250,13 @@
           <a:cs typeface="+mn-cs"/>
         </a:defRPr>
       </a:lvl4pPr>
-      <a:lvl5pPr marL="2057400" indent="-228600" algn="l" defTabSz="914400" rtl="0" eaLnBrk="1" latinLnBrk="0" hangingPunct="1">
+      <a:lvl5pPr marL="1543050" indent="-171450" algn="l" defTabSz="685800" rtl="0" eaLnBrk="1" latinLnBrk="0" hangingPunct="1">
         <a:spcBef>
           <a:spcPct val="20000"/>
         </a:spcBef>
         <a:buFont typeface="Arial" panose="020B0604020202020204" pitchFamily="34" charset="0"/>
         <a:buChar char="»"/>
-        <a:defRPr sz="2000" kern="1200">
+        <a:defRPr sz="1500" kern="1200">
           <a:solidFill>
             <a:schemeClr val="tx1"/>
           </a:solidFill>
@@ -3265,13 +3265,13 @@
           <a:cs typeface="+mn-cs"/>
         </a:defRPr>
       </a:lvl5pPr>
-      <a:lvl6pPr marL="2514600" indent="-228600" algn="l" defTabSz="914400" rtl="0" eaLnBrk="1" latinLnBrk="0" hangingPunct="1">
+      <a:lvl6pPr marL="1885950" indent="-171450" algn="l" defTabSz="685800" rtl="0" eaLnBrk="1" latinLnBrk="0" hangingPunct="1">
         <a:spcBef>
           <a:spcPct val="20000"/>
         </a:spcBef>
         <a:buFont typeface="Arial" panose="020B0604020202020204" pitchFamily="34" charset="0"/>
         <a:buChar char="•"/>
-        <a:defRPr sz="2000" kern="1200">
+        <a:defRPr sz="1500" kern="1200">
           <a:solidFill>
             <a:schemeClr val="tx1"/>
           </a:solidFill>
@@ -3280,13 +3280,13 @@
           <a:cs typeface="+mn-cs"/>
         </a:defRPr>
       </a:lvl6pPr>
-      <a:lvl7pPr marL="2971800" indent="-228600" algn="l" defTabSz="914400" rtl="0" eaLnBrk="1" latinLnBrk="0" hangingPunct="1">
+      <a:lvl7pPr marL="2228850" indent="-171450" algn="l" defTabSz="685800" rtl="0" eaLnBrk="1" latinLnBrk="0" hangingPunct="1">
         <a:spcBef>
           <a:spcPct val="20000"/>
         </a:spcBef>
         <a:buFont typeface="Arial" panose="020B0604020202020204" pitchFamily="34" charset="0"/>
         <a:buChar char="•"/>
-        <a:defRPr sz="2000" kern="1200">
+        <a:defRPr sz="1500" kern="1200">
           <a:solidFill>
             <a:schemeClr val="tx1"/>
           </a:solidFill>
@@ -3295,13 +3295,13 @@
           <a:cs typeface="+mn-cs"/>
         </a:defRPr>
       </a:lvl7pPr>
-      <a:lvl8pPr marL="3429000" indent="-228600" algn="l" defTabSz="914400" rtl="0" eaLnBrk="1" latinLnBrk="0" hangingPunct="1">
+      <a:lvl8pPr marL="2571750" indent="-171450" algn="l" defTabSz="685800" rtl="0" eaLnBrk="1" latinLnBrk="0" hangingPunct="1">
         <a:spcBef>
           <a:spcPct val="20000"/>
         </a:spcBef>
         <a:buFont typeface="Arial" panose="020B0604020202020204" pitchFamily="34" charset="0"/>
         <a:buChar char="•"/>
-        <a:defRPr sz="2000" kern="1200">
+        <a:defRPr sz="1500" kern="1200">
           <a:solidFill>
             <a:schemeClr val="tx1"/>
           </a:solidFill>
@@ -3310,13 +3310,13 @@
           <a:cs typeface="+mn-cs"/>
         </a:defRPr>
       </a:lvl8pPr>
-      <a:lvl9pPr marL="3886200" indent="-228600" algn="l" defTabSz="914400" rtl="0" eaLnBrk="1" latinLnBrk="0" hangingPunct="1">
+      <a:lvl9pPr marL="2914650" indent="-171450" algn="l" defTabSz="685800" rtl="0" eaLnBrk="1" latinLnBrk="0" hangingPunct="1">
         <a:spcBef>
           <a:spcPct val="20000"/>
         </a:spcBef>
         <a:buFont typeface="Arial" panose="020B0604020202020204" pitchFamily="34" charset="0"/>
         <a:buChar char="•"/>
-        <a:defRPr sz="2000" kern="1200">
+        <a:defRPr sz="1500" kern="1200">
           <a:solidFill>
             <a:schemeClr val="tx1"/>
           </a:solidFill>
@@ -3330,8 +3330,8 @@
       <a:defPPr>
         <a:defRPr lang="en-US"/>
       </a:defPPr>
-      <a:lvl1pPr marL="0" algn="l" defTabSz="914400" rtl="0" eaLnBrk="1" latinLnBrk="0" hangingPunct="1">
-        <a:defRPr sz="1800" kern="1200">
+      <a:lvl1pPr marL="0" algn="l" defTabSz="685800" rtl="0" eaLnBrk="1" latinLnBrk="0" hangingPunct="1">
+        <a:defRPr sz="1350" kern="1200">
           <a:solidFill>
             <a:schemeClr val="tx1"/>
           </a:solidFill>
@@ -3340,8 +3340,8 @@
           <a:cs typeface="+mn-cs"/>
         </a:defRPr>
       </a:lvl1pPr>
-      <a:lvl2pPr marL="457200" algn="l" defTabSz="914400" rtl="0" eaLnBrk="1" latinLnBrk="0" hangingPunct="1">
-        <a:defRPr sz="1800" kern="1200">
+      <a:lvl2pPr marL="342900" algn="l" defTabSz="685800" rtl="0" eaLnBrk="1" latinLnBrk="0" hangingPunct="1">
+        <a:defRPr sz="1350" kern="1200">
           <a:solidFill>
             <a:schemeClr val="tx1"/>
           </a:solidFill>
@@ -3350,8 +3350,8 @@
           <a:cs typeface="+mn-cs"/>
         </a:defRPr>
       </a:lvl2pPr>
-      <a:lvl3pPr marL="914400" algn="l" defTabSz="914400" rtl="0" eaLnBrk="1" latinLnBrk="0" hangingPunct="1">
-        <a:defRPr sz="1800" kern="1200">
+      <a:lvl3pPr marL="685800" algn="l" defTabSz="685800" rtl="0" eaLnBrk="1" latinLnBrk="0" hangingPunct="1">
+        <a:defRPr sz="1350" kern="1200">
           <a:solidFill>
             <a:schemeClr val="tx1"/>
           </a:solidFill>
@@ -3360,8 +3360,8 @@
           <a:cs typeface="+mn-cs"/>
         </a:defRPr>
       </a:lvl3pPr>
-      <a:lvl4pPr marL="1371600" algn="l" defTabSz="914400" rtl="0" eaLnBrk="1" latinLnBrk="0" hangingPunct="1">
-        <a:defRPr sz="1800" kern="1200">
+      <a:lvl4pPr marL="1028700" algn="l" defTabSz="685800" rtl="0" eaLnBrk="1" latinLnBrk="0" hangingPunct="1">
+        <a:defRPr sz="1350" kern="1200">
           <a:solidFill>
             <a:schemeClr val="tx1"/>
           </a:solidFill>
@@ -3370,8 +3370,8 @@
           <a:cs typeface="+mn-cs"/>
         </a:defRPr>
       </a:lvl4pPr>
-      <a:lvl5pPr marL="1828800" algn="l" defTabSz="914400" rtl="0" eaLnBrk="1" latinLnBrk="0" hangingPunct="1">
-        <a:defRPr sz="1800" kern="1200">
+      <a:lvl5pPr marL="1371600" algn="l" defTabSz="685800" rtl="0" eaLnBrk="1" latinLnBrk="0" hangingPunct="1">
+        <a:defRPr sz="1350" kern="1200">
           <a:solidFill>
             <a:schemeClr val="tx1"/>
           </a:solidFill>
@@ -3380,8 +3380,8 @@
           <a:cs typeface="+mn-cs"/>
         </a:defRPr>
       </a:lvl5pPr>
-      <a:lvl6pPr marL="2286000" algn="l" defTabSz="914400" rtl="0" eaLnBrk="1" latinLnBrk="0" hangingPunct="1">
-        <a:defRPr sz="1800" kern="1200">
+      <a:lvl6pPr marL="1714500" algn="l" defTabSz="685800" rtl="0" eaLnBrk="1" latinLnBrk="0" hangingPunct="1">
+        <a:defRPr sz="1350" kern="1200">
           <a:solidFill>
             <a:schemeClr val="tx1"/>
           </a:solidFill>
@@ -3390,8 +3390,8 @@
           <a:cs typeface="+mn-cs"/>
         </a:defRPr>
       </a:lvl6pPr>
-      <a:lvl7pPr marL="2743200" algn="l" defTabSz="914400" rtl="0" eaLnBrk="1" latinLnBrk="0" hangingPunct="1">
-        <a:defRPr sz="1800" kern="1200">
+      <a:lvl7pPr marL="2057400" algn="l" defTabSz="685800" rtl="0" eaLnBrk="1" latinLnBrk="0" hangingPunct="1">
+        <a:defRPr sz="1350" kern="1200">
           <a:solidFill>
             <a:schemeClr val="tx1"/>
           </a:solidFill>
@@ -3400,8 +3400,8 @@
           <a:cs typeface="+mn-cs"/>
         </a:defRPr>
       </a:lvl7pPr>
-      <a:lvl8pPr marL="3200400" algn="l" defTabSz="914400" rtl="0" eaLnBrk="1" latinLnBrk="0" hangingPunct="1">
-        <a:defRPr sz="1800" kern="1200">
+      <a:lvl8pPr marL="2400300" algn="l" defTabSz="685800" rtl="0" eaLnBrk="1" latinLnBrk="0" hangingPunct="1">
+        <a:defRPr sz="1350" kern="1200">
           <a:solidFill>
             <a:schemeClr val="tx1"/>
           </a:solidFill>
@@ -3410,8 +3410,8 @@
           <a:cs typeface="+mn-cs"/>
         </a:defRPr>
       </a:lvl8pPr>
-      <a:lvl9pPr marL="3657600" algn="l" defTabSz="914400" rtl="0" eaLnBrk="1" latinLnBrk="0" hangingPunct="1">
-        <a:defRPr sz="1800" kern="1200">
+      <a:lvl9pPr marL="2743200" algn="l" defTabSz="685800" rtl="0" eaLnBrk="1" latinLnBrk="0" hangingPunct="1">
+        <a:defRPr sz="1350" kern="1200">
           <a:solidFill>
             <a:schemeClr val="tx1"/>
           </a:solidFill>
@@ -3450,8 +3450,8 @@
         </p:nvSpPr>
         <p:spPr>
           <a:xfrm>
-            <a:off x="7553637" y="96475"/>
-            <a:ext cx="2678230" cy="6653628"/>
+            <a:off x="5858045" y="188259"/>
+            <a:ext cx="3009813" cy="6629353"/>
           </a:xfrm>
           <a:prstGeom prst="roundRect">
             <a:avLst>
@@ -3488,14 +3488,14 @@
           <a:lstStyle/>
           <a:p>
             <a:r>
-              <a:rPr lang="en-US" sz="1200" b="1" dirty="0">
+              <a:rPr lang="en-US" sz="900" b="1" dirty="0">
                 <a:solidFill>
                   <a:srgbClr val="7030A0"/>
                 </a:solidFill>
               </a:rPr>
               <a:t>Model</a:t>
             </a:r>
-            <a:endParaRPr lang="en-SG" sz="1200" b="1" dirty="0">
+            <a:endParaRPr lang="en-SG" sz="900" b="1" dirty="0">
               <a:solidFill>
                 <a:srgbClr val="7030A0"/>
               </a:solidFill>
@@ -3511,8 +3511,8 @@
         </p:nvSpPr>
         <p:spPr>
           <a:xfrm>
-            <a:off x="1477363" y="241724"/>
-            <a:ext cx="5978426" cy="6514090"/>
+            <a:off x="0" y="161924"/>
+            <a:ext cx="5748297" cy="6629353"/>
           </a:xfrm>
           <a:prstGeom prst="roundRect">
             <a:avLst>
@@ -3549,14 +3549,14 @@
           <a:lstStyle/>
           <a:p>
             <a:r>
-              <a:rPr lang="en-US" sz="1200" b="1" dirty="0">
+              <a:rPr lang="en-US" sz="900" b="1" dirty="0">
                 <a:solidFill>
                   <a:srgbClr val="0070C0"/>
                 </a:solidFill>
               </a:rPr>
               <a:t>Logic</a:t>
             </a:r>
-            <a:endParaRPr lang="en-SG" sz="1200" b="1" dirty="0">
+            <a:endParaRPr lang="en-SG" sz="900" b="1" dirty="0">
               <a:solidFill>
                 <a:srgbClr val="0070C0"/>
               </a:solidFill>
@@ -3572,8 +3572,8 @@
         </p:nvSpPr>
         <p:spPr>
           <a:xfrm>
-            <a:off x="1980160" y="670362"/>
-            <a:ext cx="1484042" cy="370397"/>
+            <a:off x="847477" y="485356"/>
+            <a:ext cx="1113032" cy="277798"/>
           </a:xfrm>
           <a:prstGeom prst="rect">
             <a:avLst/>
@@ -3608,7 +3608,7 @@
           <a:p>
             <a:pPr algn="ctr"/>
             <a:r>
-              <a:rPr lang="en-US" sz="1600" dirty="0">
+              <a:rPr lang="en-US" sz="1200" dirty="0">
                 <a:solidFill>
                   <a:schemeClr val="bg1"/>
                 </a:solidFill>
@@ -3616,14 +3616,14 @@
               <a:t>:</a:t>
             </a:r>
             <a:r>
-              <a:rPr lang="en-US" sz="1600" dirty="0" err="1">
+              <a:rPr lang="en-US" sz="1200" dirty="0" err="1">
                 <a:solidFill>
                   <a:schemeClr val="bg1"/>
                 </a:solidFill>
               </a:rPr>
               <a:t>LogicManager</a:t>
             </a:r>
-            <a:endParaRPr lang="en-SG" sz="1600" dirty="0">
+            <a:endParaRPr lang="en-SG" sz="1200" dirty="0">
               <a:solidFill>
                 <a:schemeClr val="bg1"/>
               </a:solidFill>
@@ -3641,8 +3641,8 @@
         </p:nvCxnSpPr>
         <p:spPr>
           <a:xfrm flipH="1">
-            <a:off x="2697414" y="1034031"/>
-            <a:ext cx="10560" cy="5832450"/>
+            <a:off x="1391872" y="758107"/>
+            <a:ext cx="1466" cy="5880818"/>
           </a:xfrm>
           <a:prstGeom prst="line">
             <a:avLst/>
@@ -3678,8 +3678,8 @@
         </p:nvSpPr>
         <p:spPr>
           <a:xfrm>
-            <a:off x="2635968" y="1384724"/>
-            <a:ext cx="159641" cy="5231513"/>
+            <a:off x="1339332" y="1021127"/>
+            <a:ext cx="137535" cy="5465397"/>
           </a:xfrm>
           <a:prstGeom prst="rect">
             <a:avLst/>
@@ -3713,7 +3713,7 @@
           <a:lstStyle/>
           <a:p>
             <a:pPr algn="ctr"/>
-            <a:endParaRPr lang="en-SG" sz="1400"/>
+            <a:endParaRPr lang="en-SG" sz="1050"/>
           </a:p>
         </p:txBody>
       </p:sp>
@@ -3725,8 +3725,8 @@
         </p:nvSpPr>
         <p:spPr>
           <a:xfrm>
-            <a:off x="4534203" y="549436"/>
-            <a:ext cx="1242998" cy="499564"/>
+            <a:off x="2432270" y="491318"/>
+            <a:ext cx="942733" cy="257388"/>
           </a:xfrm>
           <a:prstGeom prst="rect">
             <a:avLst/>
@@ -3761,7 +3761,7 @@
           <a:p>
             <a:pPr algn="ctr"/>
             <a:r>
-              <a:rPr lang="en-US" sz="1600" dirty="0">
+              <a:rPr lang="en-US" sz="900" dirty="0">
                 <a:solidFill>
                   <a:schemeClr val="bg1"/>
                 </a:solidFill>
@@ -3772,14 +3772,14 @@
           <a:p>
             <a:pPr algn="ctr"/>
             <a:r>
-              <a:rPr lang="en-US" sz="1600" dirty="0" err="1">
+              <a:rPr lang="en-US" sz="900" dirty="0" err="1">
                 <a:solidFill>
                   <a:schemeClr val="bg1"/>
                 </a:solidFill>
               </a:rPr>
               <a:t>BookParser</a:t>
             </a:r>
-            <a:endParaRPr lang="en-SG" sz="1600" dirty="0">
+            <a:endParaRPr lang="en-SG" sz="900" dirty="0">
               <a:solidFill>
                 <a:schemeClr val="bg1"/>
               </a:solidFill>
@@ -3797,8 +3797,8 @@
         </p:nvCxnSpPr>
         <p:spPr>
           <a:xfrm>
-            <a:off x="5147602" y="1034034"/>
-            <a:ext cx="0" cy="1584073"/>
+            <a:off x="2868981" y="737846"/>
+            <a:ext cx="0" cy="1188055"/>
           </a:xfrm>
           <a:prstGeom prst="line">
             <a:avLst/>
@@ -3834,8 +3834,8 @@
         </p:nvSpPr>
         <p:spPr>
           <a:xfrm>
-            <a:off x="5075595" y="1492226"/>
-            <a:ext cx="157422" cy="820127"/>
+            <a:off x="2814955" y="1057864"/>
+            <a:ext cx="118067" cy="615095"/>
           </a:xfrm>
           <a:prstGeom prst="rect">
             <a:avLst/>
@@ -3869,49 +3869,10 @@
           <a:lstStyle/>
           <a:p>
             <a:pPr algn="ctr"/>
-            <a:endParaRPr lang="en-SG" sz="1400"/>
-          </a:p>
-        </p:txBody>
-      </p:sp>
-      <p:cxnSp>
-        <p:nvCxnSpPr>
-          <p:cNvPr id="20" name="Straight Connector 19"/>
-          <p:cNvCxnSpPr>
-            <a:cxnSpLocks/>
-          </p:cNvCxnSpPr>
-          <p:nvPr/>
-        </p:nvCxnSpPr>
-        <p:spPr>
-          <a:xfrm>
-            <a:off x="6699097" y="1787754"/>
-            <a:ext cx="1489" cy="4968060"/>
-          </a:xfrm>
-          <a:prstGeom prst="line">
-            <a:avLst/>
-          </a:prstGeom>
-          <a:ln w="19050">
-            <a:solidFill>
-              <a:srgbClr val="0070C0"/>
-            </a:solidFill>
-            <a:prstDash val="sysDash"/>
-          </a:ln>
-          <a:effectLst/>
-        </p:spPr>
-        <p:style>
-          <a:lnRef idx="1">
-            <a:schemeClr val="accent1"/>
-          </a:lnRef>
-          <a:fillRef idx="2">
-            <a:schemeClr val="accent1"/>
-          </a:fillRef>
-          <a:effectRef idx="1">
-            <a:schemeClr val="accent1"/>
-          </a:effectRef>
-          <a:fontRef idx="minor">
-            <a:schemeClr val="dk1"/>
-          </a:fontRef>
-        </p:style>
-      </p:cxnSp>
+            <a:endParaRPr lang="en-SG" sz="1050"/>
+          </a:p>
+        </p:txBody>
+      </p:sp>
       <p:sp>
         <p:nvSpPr>
           <p:cNvPr id="21" name="Rectangle 20"/>
@@ -3920,8 +3881,8 @@
         </p:nvSpPr>
         <p:spPr>
           <a:xfrm>
-            <a:off x="6622899" y="1740050"/>
-            <a:ext cx="155375" cy="294817"/>
+            <a:off x="3997307" y="1126161"/>
+            <a:ext cx="118067" cy="450059"/>
           </a:xfrm>
           <a:prstGeom prst="rect">
             <a:avLst/>
@@ -3955,7 +3916,7 @@
           <a:lstStyle/>
           <a:p>
             <a:pPr algn="ctr"/>
-            <a:endParaRPr lang="en-SG" sz="1400"/>
+            <a:endParaRPr lang="en-SG" sz="1050"/>
           </a:p>
         </p:txBody>
       </p:sp>
@@ -3968,9 +3929,9 @@
           <p:nvPr/>
         </p:nvCxnSpPr>
         <p:spPr>
-          <a:xfrm>
-            <a:off x="1516115" y="1388413"/>
-            <a:ext cx="1141710" cy="0"/>
+          <a:xfrm flipV="1">
+            <a:off x="-20148" y="1023894"/>
+            <a:ext cx="1375874" cy="12028"/>
           </a:xfrm>
           <a:prstGeom prst="straightConnector1">
             <a:avLst/>
@@ -4005,8 +3966,8 @@
         </p:nvSpPr>
         <p:spPr>
           <a:xfrm>
-            <a:off x="1135115" y="1117017"/>
-            <a:ext cx="1452658" cy="430887"/>
+            <a:off x="9366" y="755856"/>
+            <a:ext cx="1279181" cy="276999"/>
           </a:xfrm>
           <a:prstGeom prst="rect">
             <a:avLst/>
@@ -4021,12 +3982,12 @@
           <a:p>
             <a:pPr algn="r"/>
             <a:r>
-              <a:rPr lang="en-US" sz="1400" dirty="0">
+              <a:rPr lang="en-US" sz="900" dirty="0">
                 <a:solidFill>
                   <a:srgbClr val="0070C0"/>
                 </a:solidFill>
               </a:rPr>
-              <a:t>execute(“mark 98765432”)</a:t>
+              <a:t>execute(“unmark 98765432”)</a:t>
             </a:r>
           </a:p>
         </p:txBody>
@@ -4041,8 +4002,8 @@
         </p:nvCxnSpPr>
         <p:spPr>
           <a:xfrm flipV="1">
-            <a:off x="5232990" y="1638758"/>
-            <a:ext cx="940397" cy="1"/>
+            <a:off x="2862410" y="1155561"/>
+            <a:ext cx="1134897" cy="14054"/>
           </a:xfrm>
           <a:prstGeom prst="straightConnector1">
             <a:avLst/>
@@ -4077,8 +4038,8 @@
         </p:nvSpPr>
         <p:spPr>
           <a:xfrm>
-            <a:off x="4340436" y="2610485"/>
-            <a:ext cx="872514" cy="215444"/>
+            <a:off x="2617684" y="1940448"/>
+            <a:ext cx="654386" cy="161583"/>
           </a:xfrm>
           <a:prstGeom prst="rect">
             <a:avLst/>
@@ -4103,7 +4064,7 @@
           </a:lstStyle>
           <a:p>
             <a:r>
-              <a:rPr lang="en-US" dirty="0"/>
+              <a:rPr lang="en-US" sz="1050" dirty="0"/>
               <a:t>execute()</a:t>
             </a:r>
           </a:p>
@@ -4114,13 +4075,14 @@
           <p:cNvPr id="34" name="Straight Arrow Connector 33"/>
           <p:cNvCxnSpPr>
             <a:cxnSpLocks/>
+            <a:endCxn id="21" idx="2"/>
           </p:cNvCxnSpPr>
           <p:nvPr/>
         </p:nvCxnSpPr>
         <p:spPr>
           <a:xfrm>
-            <a:off x="5206123" y="2004646"/>
-            <a:ext cx="1522116" cy="0"/>
+            <a:off x="2928481" y="1567690"/>
+            <a:ext cx="1127860" cy="8530"/>
           </a:xfrm>
           <a:prstGeom prst="straightConnector1">
             <a:avLst/>
@@ -4154,13 +4116,14 @@
           <p:cNvPr id="35" name="Straight Arrow Connector 34"/>
           <p:cNvCxnSpPr>
             <a:cxnSpLocks/>
+            <a:endCxn id="18" idx="2"/>
           </p:cNvCxnSpPr>
           <p:nvPr/>
         </p:nvCxnSpPr>
         <p:spPr>
-          <a:xfrm>
-            <a:off x="2788366" y="2260014"/>
-            <a:ext cx="2393900" cy="0"/>
+          <a:xfrm flipV="1">
+            <a:off x="1453632" y="1672959"/>
+            <a:ext cx="1420357" cy="4636"/>
           </a:xfrm>
           <a:prstGeom prst="straightConnector1">
             <a:avLst/>
@@ -4199,8 +4162,8 @@
         </p:nvCxnSpPr>
         <p:spPr>
           <a:xfrm>
-            <a:off x="1380458" y="6502126"/>
-            <a:ext cx="1219397" cy="0"/>
+            <a:off x="441178" y="6334125"/>
+            <a:ext cx="914548" cy="0"/>
           </a:xfrm>
           <a:prstGeom prst="straightConnector1">
             <a:avLst/>
@@ -4237,8 +4200,8 @@
         </p:nvSpPr>
         <p:spPr>
           <a:xfrm>
-            <a:off x="6821970" y="2904517"/>
-            <a:ext cx="1127620" cy="369332"/>
+            <a:off x="5343131" y="2364435"/>
+            <a:ext cx="845715" cy="138499"/>
           </a:xfrm>
           <a:prstGeom prst="rect">
             <a:avLst/>
@@ -4263,22 +4226,22 @@
           </a:lstStyle>
           <a:p>
             <a:r>
-              <a:rPr lang="en-US" sz="1200" dirty="0" err="1">
+              <a:rPr lang="en-US" sz="900" dirty="0" err="1">
                 <a:solidFill>
                   <a:srgbClr val="7030A0"/>
                 </a:solidFill>
               </a:rPr>
-              <a:t>getFilteredPersonList</a:t>
-            </a:r>
-            <a:r>
-              <a:rPr lang="en-US" sz="1200" dirty="0">
+              <a:t>getAddressBook</a:t>
+            </a:r>
+            <a:r>
+              <a:rPr lang="en-US" sz="900" dirty="0">
                 <a:solidFill>
                   <a:srgbClr val="7030A0"/>
                 </a:solidFill>
               </a:rPr>
               <a:t>()</a:t>
             </a:r>
-            <a:endParaRPr lang="en-US" sz="1200" dirty="0"/>
+            <a:endParaRPr lang="en-US" sz="900" dirty="0"/>
           </a:p>
         </p:txBody>
       </p:sp>
@@ -4290,8 +4253,8 @@
         </p:nvSpPr>
         <p:spPr>
           <a:xfrm>
-            <a:off x="2982207" y="1232567"/>
-            <a:ext cx="1936629" cy="430887"/>
+            <a:off x="1723931" y="837186"/>
+            <a:ext cx="1112114" cy="276999"/>
           </a:xfrm>
           <a:prstGeom prst="rect">
             <a:avLst/>
@@ -4316,12 +4279,12 @@
           </a:lstStyle>
           <a:p>
             <a:r>
-              <a:rPr lang="en-US" dirty="0" err="1"/>
+              <a:rPr lang="en-US" sz="900" dirty="0" err="1"/>
               <a:t>parseCommand</a:t>
             </a:r>
             <a:r>
-              <a:rPr lang="en-US" dirty="0"/>
-              <a:t>(“mark 98765432”)</a:t>
+              <a:rPr lang="en-US" sz="900" dirty="0"/>
+              <a:t>(“unmark 98765432”)</a:t>
             </a:r>
           </a:p>
         </p:txBody>
@@ -4334,8 +4297,8 @@
         </p:nvSpPr>
         <p:spPr>
           <a:xfrm>
-            <a:off x="4426512" y="6019800"/>
-            <a:ext cx="633342" cy="215444"/>
+            <a:off x="2859924" y="5943942"/>
+            <a:ext cx="475007" cy="161583"/>
           </a:xfrm>
           <a:prstGeom prst="rect">
             <a:avLst/>
@@ -4360,7 +4323,7 @@
           </a:lstStyle>
           <a:p>
             <a:r>
-              <a:rPr lang="en-US" dirty="0"/>
+              <a:rPr lang="en-US" sz="1050" dirty="0"/>
               <a:t>result</a:t>
             </a:r>
           </a:p>
@@ -4374,8 +4337,8 @@
         </p:nvSpPr>
         <p:spPr>
           <a:xfrm>
-            <a:off x="1644726" y="6257027"/>
-            <a:ext cx="776874" cy="215444"/>
+            <a:off x="651700" y="6105525"/>
+            <a:ext cx="582656" cy="161583"/>
           </a:xfrm>
           <a:prstGeom prst="rect">
             <a:avLst/>
@@ -4400,7 +4363,7 @@
           </a:lstStyle>
           <a:p>
             <a:r>
-              <a:rPr lang="en-US" dirty="0"/>
+              <a:rPr lang="en-US" sz="1050" dirty="0"/>
               <a:t>result</a:t>
             </a:r>
           </a:p>
@@ -4414,8 +4377,8 @@
         </p:nvSpPr>
         <p:spPr>
           <a:xfrm>
-            <a:off x="3821807" y="2032207"/>
-            <a:ext cx="224644" cy="215444"/>
+            <a:off x="2092260" y="1492714"/>
+            <a:ext cx="168483" cy="161583"/>
           </a:xfrm>
           <a:prstGeom prst="rect">
             <a:avLst/>
@@ -4440,7 +4403,7 @@
           </a:lstStyle>
           <a:p>
             <a:r>
-              <a:rPr lang="en-US" dirty="0"/>
+              <a:rPr lang="en-US" sz="1050" dirty="0"/>
               <a:t>m</a:t>
             </a:r>
           </a:p>
@@ -4454,8 +4417,8 @@
         </p:nvSpPr>
         <p:spPr>
           <a:xfrm>
-            <a:off x="7702948" y="2193214"/>
-            <a:ext cx="858064" cy="320642"/>
+            <a:off x="6100871" y="1787494"/>
+            <a:ext cx="643548" cy="240482"/>
           </a:xfrm>
           <a:prstGeom prst="rect">
             <a:avLst/>
@@ -4490,14 +4453,22 @@
           <a:p>
             <a:pPr algn="ctr"/>
             <a:r>
-              <a:rPr lang="en-US" sz="1600" dirty="0">
+              <a:rPr lang="en-US" sz="1200" dirty="0">
                 <a:solidFill>
                   <a:schemeClr val="bg1"/>
                 </a:solidFill>
               </a:rPr>
-              <a:t>: Model</a:t>
-            </a:r>
-            <a:endParaRPr lang="en-SG" sz="1600" dirty="0">
+              <a:t>: </a:t>
+            </a:r>
+            <a:r>
+              <a:rPr lang="en-US" sz="1000" dirty="0">
+                <a:solidFill>
+                  <a:schemeClr val="bg1"/>
+                </a:solidFill>
+              </a:rPr>
+              <a:t>Model</a:t>
+            </a:r>
+            <a:endParaRPr lang="en-SG" sz="1000" dirty="0">
               <a:solidFill>
                 <a:schemeClr val="bg1"/>
               </a:solidFill>
@@ -4513,8 +4484,8 @@
         </p:nvSpPr>
         <p:spPr>
           <a:xfrm>
-            <a:off x="8001943" y="3101758"/>
-            <a:ext cx="139064" cy="834868"/>
+            <a:off x="6332515" y="2489621"/>
+            <a:ext cx="104298" cy="626151"/>
           </a:xfrm>
           <a:prstGeom prst="rect">
             <a:avLst/>
@@ -4548,48 +4519,10 @@
           <a:lstStyle/>
           <a:p>
             <a:pPr algn="ctr"/>
-            <a:endParaRPr lang="en-SG" sz="1400"/>
-          </a:p>
-        </p:txBody>
-      </p:sp>
-      <p:cxnSp>
-        <p:nvCxnSpPr>
-          <p:cNvPr id="50" name="Straight Arrow Connector 49"/>
-          <p:cNvCxnSpPr>
-            <a:cxnSpLocks/>
-          </p:cNvCxnSpPr>
-          <p:nvPr/>
-        </p:nvCxnSpPr>
-        <p:spPr>
-          <a:xfrm>
-            <a:off x="6782770" y="3101758"/>
-            <a:ext cx="1233970" cy="0"/>
-          </a:xfrm>
-          <a:prstGeom prst="straightConnector1">
-            <a:avLst/>
-          </a:prstGeom>
-          <a:ln w="19050">
-            <a:solidFill>
-              <a:srgbClr val="0070C0"/>
-            </a:solidFill>
-            <a:tailEnd type="arrow"/>
-          </a:ln>
-        </p:spPr>
-        <p:style>
-          <a:lnRef idx="1">
-            <a:schemeClr val="accent1"/>
-          </a:lnRef>
-          <a:fillRef idx="0">
-            <a:schemeClr val="accent1"/>
-          </a:fillRef>
-          <a:effectRef idx="0">
-            <a:schemeClr val="accent1"/>
-          </a:effectRef>
-          <a:fontRef idx="minor">
-            <a:schemeClr val="tx1"/>
-          </a:fontRef>
-        </p:style>
-      </p:cxnSp>
+            <a:endParaRPr lang="en-SG" sz="1050"/>
+          </a:p>
+        </p:txBody>
+      </p:sp>
       <p:sp>
         <p:nvSpPr>
           <p:cNvPr id="19" name="Rectangle 62"/>
@@ -4598,8 +4531,8 @@
         </p:nvSpPr>
         <p:spPr>
           <a:xfrm>
-            <a:off x="6132991" y="1386684"/>
-            <a:ext cx="1114982" cy="492999"/>
+            <a:off x="3600865" y="590287"/>
+            <a:ext cx="910949" cy="315015"/>
           </a:xfrm>
           <a:prstGeom prst="rect">
             <a:avLst/>
@@ -4634,29 +4567,22 @@
           <a:p>
             <a:pPr algn="ctr"/>
             <a:r>
-              <a:rPr lang="en-US" sz="1600" dirty="0">
+              <a:rPr lang="en-US" sz="1000" dirty="0">
                 <a:solidFill>
                   <a:schemeClr val="bg1"/>
                 </a:solidFill>
               </a:rPr>
-              <a:t>m:Mark</a:t>
-            </a:r>
-            <a:br>
-              <a:rPr lang="en-US" sz="1600" dirty="0">
+              <a:t>:</a:t>
+            </a:r>
+            <a:r>
+              <a:rPr lang="en-US" sz="1000" dirty="0" err="1">
                 <a:solidFill>
                   <a:schemeClr val="bg1"/>
                 </a:solidFill>
               </a:rPr>
-            </a:br>
-            <a:r>
-              <a:rPr lang="en-US" sz="1600" dirty="0">
-                <a:solidFill>
-                  <a:schemeClr val="bg1"/>
-                </a:solidFill>
-              </a:rPr>
-              <a:t>Command</a:t>
-            </a:r>
-            <a:endParaRPr lang="en-SG" sz="1600" dirty="0">
+              <a:t>UnmarkCommandParser</a:t>
+            </a:r>
+            <a:endParaRPr lang="en-SG" sz="1000" dirty="0">
               <a:solidFill>
                 <a:schemeClr val="bg1"/>
               </a:solidFill>
@@ -4679,9 +4605,9 @@
           <p:nvPr/>
         </p:nvCxnSpPr>
         <p:spPr>
-          <a:xfrm>
-            <a:off x="2788366" y="2857731"/>
-            <a:ext cx="3906966" cy="1"/>
+          <a:xfrm flipV="1">
+            <a:off x="1453631" y="2102031"/>
+            <a:ext cx="3630411" cy="23852"/>
           </a:xfrm>
           <a:prstGeom prst="straightConnector1">
             <a:avLst/>
@@ -4724,8 +4650,8 @@
         </p:nvCxnSpPr>
         <p:spPr>
           <a:xfrm>
-            <a:off x="2805263" y="1490335"/>
-            <a:ext cx="2300755" cy="1"/>
+            <a:off x="1466305" y="1100336"/>
+            <a:ext cx="1355343" cy="0"/>
           </a:xfrm>
           <a:prstGeom prst="straightConnector1">
             <a:avLst/>
@@ -4768,8 +4694,8 @@
         </p:nvCxnSpPr>
         <p:spPr>
           <a:xfrm>
-            <a:off x="2845758" y="6265186"/>
-            <a:ext cx="3906307" cy="0"/>
+            <a:off x="1466305" y="6105525"/>
+            <a:ext cx="3649512" cy="0"/>
           </a:xfrm>
           <a:prstGeom prst="straightConnector1">
             <a:avLst/>
@@ -4809,14 +4735,13 @@
           </p:cNvPr>
           <p:cNvCxnSpPr>
             <a:cxnSpLocks/>
-            <a:endCxn id="49" idx="2"/>
           </p:cNvCxnSpPr>
           <p:nvPr/>
         </p:nvCxnSpPr>
         <p:spPr>
-          <a:xfrm>
-            <a:off x="6827863" y="3924783"/>
-            <a:ext cx="1243612" cy="11843"/>
+          <a:xfrm flipV="1">
+            <a:off x="5236212" y="3095054"/>
+            <a:ext cx="1141054" cy="5985"/>
           </a:xfrm>
           <a:prstGeom prst="straightConnector1">
             <a:avLst/>
@@ -4859,8 +4784,8 @@
         </p:nvSpPr>
         <p:spPr>
           <a:xfrm>
-            <a:off x="5571687" y="4031395"/>
-            <a:ext cx="1897130" cy="994018"/>
+            <a:off x="5161470" y="6942442"/>
+            <a:ext cx="1422848" cy="745514"/>
           </a:xfrm>
           <a:prstGeom prst="roundRect">
             <a:avLst>
@@ -4900,7 +4825,7 @@
           <a:bodyPr rtlCol="0" anchor="t"/>
           <a:lstStyle/>
           <a:p>
-            <a:endParaRPr lang="en-SG" sz="1200" b="1" dirty="0">
+            <a:endParaRPr lang="en-SG" sz="900" b="1" dirty="0">
               <a:solidFill>
                 <a:srgbClr val="7030A0"/>
               </a:solidFill>
@@ -4922,8 +4847,8 @@
         </p:nvSpPr>
         <p:spPr>
           <a:xfrm flipV="1">
-            <a:off x="5579012" y="4039374"/>
-            <a:ext cx="385699" cy="190166"/>
+            <a:off x="5163707" y="6948427"/>
+            <a:ext cx="289274" cy="142625"/>
           </a:xfrm>
           <a:prstGeom prst="snip1Rect">
             <a:avLst/>
@@ -4963,7 +4888,7 @@
           <a:lstStyle/>
           <a:p>
             <a:pPr algn="ctr"/>
-            <a:endParaRPr lang="en-US"/>
+            <a:endParaRPr lang="en-US" sz="1350"/>
           </a:p>
         </p:txBody>
       </p:sp>
@@ -4981,8 +4906,8 @@
         </p:nvSpPr>
         <p:spPr>
           <a:xfrm>
-            <a:off x="5065036" y="4039374"/>
-            <a:ext cx="825429" cy="184666"/>
+            <a:off x="4780580" y="6933010"/>
+            <a:ext cx="619072" cy="138499"/>
           </a:xfrm>
           <a:prstGeom prst="rect">
             <a:avLst/>
@@ -5010,7 +4935,7 @@
           </a:lstStyle>
           <a:p>
             <a:r>
-              <a:rPr lang="en-HK" sz="1200" dirty="0">
+              <a:rPr lang="en-HK" sz="900" dirty="0">
                 <a:solidFill>
                   <a:schemeClr val="accent6">
                     <a:lumMod val="50000"/>
@@ -5019,7 +4944,7 @@
               </a:rPr>
               <a:t>loop</a:t>
             </a:r>
-            <a:endParaRPr lang="en-US" sz="1200" dirty="0">
+            <a:endParaRPr lang="en-US" sz="900" dirty="0">
               <a:solidFill>
                 <a:schemeClr val="accent6">
                   <a:lumMod val="50000"/>
@@ -5043,8 +4968,8 @@
         </p:nvSpPr>
         <p:spPr>
           <a:xfrm>
-            <a:off x="7355445" y="3737595"/>
-            <a:ext cx="188355" cy="191201"/>
+            <a:off x="5236212" y="2917235"/>
+            <a:ext cx="768103" cy="138499"/>
           </a:xfrm>
           <a:prstGeom prst="rect">
             <a:avLst/>
@@ -5069,14 +4994,14 @@
           </a:lstStyle>
           <a:p>
             <a:r>
-              <a:rPr lang="en-US" sz="1200" dirty="0">
+              <a:rPr lang="en-US" sz="900" dirty="0" err="1">
                 <a:solidFill>
                   <a:srgbClr val="7030A0"/>
                 </a:solidFill>
               </a:rPr>
-              <a:t>f</a:t>
-            </a:r>
-            <a:endParaRPr lang="en-US" sz="1200" dirty="0"/>
+              <a:t>guestList</a:t>
+            </a:r>
+            <a:endParaRPr lang="en-US" sz="900" dirty="0"/>
           </a:p>
         </p:txBody>
       </p:sp>
@@ -5089,9 +5014,9 @@
           <p:nvPr/>
         </p:nvCxnSpPr>
         <p:spPr>
-          <a:xfrm flipH="1">
-            <a:off x="8066154" y="2517018"/>
-            <a:ext cx="20090" cy="4264782"/>
+          <a:xfrm>
+            <a:off x="6369053" y="2021239"/>
+            <a:ext cx="34302" cy="4592734"/>
           </a:xfrm>
           <a:prstGeom prst="line">
             <a:avLst/>
@@ -5119,53 +5044,6 @@
           </a:fontRef>
         </p:style>
       </p:cxnSp>
-      <p:sp>
-        <p:nvSpPr>
-          <p:cNvPr id="65" name="Rectangle 64"/>
-          <p:cNvSpPr/>
-          <p:nvPr/>
-        </p:nvSpPr>
-        <p:spPr>
-          <a:xfrm>
-            <a:off x="6623505" y="2857730"/>
-            <a:ext cx="188354" cy="3296787"/>
-          </a:xfrm>
-          <a:prstGeom prst="rect">
-            <a:avLst/>
-          </a:prstGeom>
-          <a:solidFill>
-            <a:srgbClr val="0070C0"/>
-          </a:solidFill>
-          <a:ln>
-            <a:solidFill>
-              <a:srgbClr val="0070C0"/>
-            </a:solidFill>
-          </a:ln>
-          <a:effectLst/>
-        </p:spPr>
-        <p:style>
-          <a:lnRef idx="1">
-            <a:schemeClr val="accent3"/>
-          </a:lnRef>
-          <a:fillRef idx="2">
-            <a:schemeClr val="accent3"/>
-          </a:fillRef>
-          <a:effectRef idx="1">
-            <a:schemeClr val="accent3"/>
-          </a:effectRef>
-          <a:fontRef idx="minor">
-            <a:schemeClr val="dk1"/>
-          </a:fontRef>
-        </p:style>
-        <p:txBody>
-          <a:bodyPr rtlCol="0" anchor="ctr"/>
-          <a:lstStyle/>
-          <a:p>
-            <a:pPr algn="ctr"/>
-            <a:endParaRPr lang="en-SG" sz="1400"/>
-          </a:p>
-        </p:txBody>
-      </p:sp>
       <p:sp>
         <p:nvSpPr>
           <p:cNvPr id="70" name="TextBox 69">
@@ -5180,8 +5058,8 @@
         </p:nvSpPr>
         <p:spPr>
           <a:xfrm>
-            <a:off x="5860639" y="4018819"/>
-            <a:ext cx="1457752" cy="184666"/>
+            <a:off x="5378184" y="6933011"/>
+            <a:ext cx="1093314" cy="138499"/>
           </a:xfrm>
           <a:prstGeom prst="rect">
             <a:avLst/>
@@ -5209,7 +5087,7 @@
           </a:lstStyle>
           <a:p>
             <a:r>
-              <a:rPr lang="en-HK" sz="1200" dirty="0">
+              <a:rPr lang="en-HK" sz="900" dirty="0">
                 <a:solidFill>
                   <a:schemeClr val="accent6">
                     <a:lumMod val="50000"/>
@@ -5218,7 +5096,7 @@
               </a:rPr>
               <a:t>[iterate for size of ‘f’]</a:t>
             </a:r>
-            <a:endParaRPr lang="en-US" sz="1200" dirty="0">
+            <a:endParaRPr lang="en-US" sz="900" dirty="0">
               <a:solidFill>
                 <a:schemeClr val="accent6">
                   <a:lumMod val="50000"/>
@@ -5230,10 +5108,10 @@
       </p:sp>
       <p:sp>
         <p:nvSpPr>
-          <p:cNvPr id="90" name="Rectangle 89">
+          <p:cNvPr id="43" name="Rectangle 62">
             <a:extLst>
               <a:ext uri="{FF2B5EF4-FFF2-40B4-BE49-F238E27FC236}">
-                <a16:creationId xmlns:a16="http://schemas.microsoft.com/office/drawing/2014/main" id="{022F8F6D-43EE-479B-A175-5180C4CA9D17}"/>
+                <a16:creationId xmlns:a16="http://schemas.microsoft.com/office/drawing/2014/main" id="{006515D3-75BF-4639-9E2C-1C59F441E214}"/>
               </a:ext>
             </a:extLst>
           </p:cNvPr>
@@ -5242,8 +5120,8 @@
         </p:nvSpPr>
         <p:spPr>
           <a:xfrm>
-            <a:off x="8019606" y="5178591"/>
-            <a:ext cx="139064" cy="834868"/>
+            <a:off x="6834197" y="2141790"/>
+            <a:ext cx="1890514" cy="247621"/>
           </a:xfrm>
           <a:prstGeom prst="rect">
             <a:avLst/>
@@ -5251,7 +5129,7 @@
           <a:solidFill>
             <a:srgbClr val="7030A0"/>
           </a:solidFill>
-          <a:ln>
+          <a:ln w="19050">
             <a:solidFill>
               <a:srgbClr val="7030A0"/>
             </a:solidFill>
@@ -5260,13 +5138,13 @@
         </p:spPr>
         <p:style>
           <a:lnRef idx="1">
-            <a:schemeClr val="accent3"/>
+            <a:schemeClr val="accent2"/>
           </a:lnRef>
           <a:fillRef idx="2">
-            <a:schemeClr val="accent3"/>
+            <a:schemeClr val="accent2"/>
           </a:fillRef>
           <a:effectRef idx="1">
-            <a:schemeClr val="accent3"/>
+            <a:schemeClr val="accent2"/>
           </a:effectRef>
           <a:fontRef idx="minor">
             <a:schemeClr val="dk1"/>
@@ -5277,16 +5155,81 @@
           <a:lstStyle/>
           <a:p>
             <a:pPr algn="ctr"/>
-            <a:endParaRPr lang="en-SG" sz="1400"/>
-          </a:p>
-        </p:txBody>
-      </p:sp>
-      <p:sp>
-        <p:nvSpPr>
-          <p:cNvPr id="91" name="TextBox 90">
+            <a:r>
+              <a:rPr lang="en-US" sz="1050" dirty="0">
+                <a:solidFill>
+                  <a:schemeClr val="bg1"/>
+                </a:solidFill>
+              </a:rPr>
+              <a:t>V : </a:t>
+            </a:r>
+            <a:r>
+              <a:rPr lang="en-US" sz="1050" dirty="0" err="1">
+                <a:solidFill>
+                  <a:schemeClr val="bg1"/>
+                </a:solidFill>
+              </a:rPr>
+              <a:t>VersionedAddressBook</a:t>
+            </a:r>
+            <a:endParaRPr lang="en-SG" sz="1050" dirty="0">
+              <a:solidFill>
+                <a:schemeClr val="bg1"/>
+              </a:solidFill>
+            </a:endParaRPr>
+          </a:p>
+        </p:txBody>
+      </p:sp>
+      <p:cxnSp>
+        <p:nvCxnSpPr>
+          <p:cNvPr id="44" name="Straight Connector 43">
             <a:extLst>
               <a:ext uri="{FF2B5EF4-FFF2-40B4-BE49-F238E27FC236}">
-                <a16:creationId xmlns:a16="http://schemas.microsoft.com/office/drawing/2014/main" id="{3D355B3F-3DC3-4D76-A8DF-C085E99FE9C3}"/>
+                <a16:creationId xmlns:a16="http://schemas.microsoft.com/office/drawing/2014/main" id="{EF81BDEB-69F5-40C9-B29A-45767E647F69}"/>
+              </a:ext>
+            </a:extLst>
+          </p:cNvPr>
+          <p:cNvCxnSpPr>
+            <a:cxnSpLocks/>
+          </p:cNvCxnSpPr>
+          <p:nvPr/>
+        </p:nvCxnSpPr>
+        <p:spPr>
+          <a:xfrm flipH="1">
+            <a:off x="7752128" y="2331533"/>
+            <a:ext cx="3548" cy="1171403"/>
+          </a:xfrm>
+          <a:prstGeom prst="line">
+            <a:avLst/>
+          </a:prstGeom>
+          <a:ln w="19050">
+            <a:solidFill>
+              <a:srgbClr val="7030A0"/>
+            </a:solidFill>
+            <a:prstDash val="sysDash"/>
+          </a:ln>
+          <a:effectLst/>
+        </p:spPr>
+        <p:style>
+          <a:lnRef idx="1">
+            <a:schemeClr val="accent1"/>
+          </a:lnRef>
+          <a:fillRef idx="2">
+            <a:schemeClr val="accent1"/>
+          </a:fillRef>
+          <a:effectRef idx="1">
+            <a:schemeClr val="accent1"/>
+          </a:effectRef>
+          <a:fontRef idx="minor">
+            <a:schemeClr val="dk1"/>
+          </a:fontRef>
+        </p:style>
+      </p:cxnSp>
+      <p:sp>
+        <p:nvSpPr>
+          <p:cNvPr id="47" name="TextBox 46">
+            <a:extLst>
+              <a:ext uri="{FF2B5EF4-FFF2-40B4-BE49-F238E27FC236}">
+                <a16:creationId xmlns:a16="http://schemas.microsoft.com/office/drawing/2014/main" id="{07C269E5-AAC8-40A4-B69F-DB7E48117D1B}"/>
               </a:ext>
             </a:extLst>
           </p:cNvPr>
@@ -5295,8 +5238,8 @@
         </p:nvSpPr>
         <p:spPr>
           <a:xfrm>
-            <a:off x="6849576" y="5150868"/>
-            <a:ext cx="1127620" cy="184666"/>
+            <a:off x="6665383" y="2446128"/>
+            <a:ext cx="845715" cy="138499"/>
           </a:xfrm>
           <a:prstGeom prst="rect">
             <a:avLst/>
@@ -5321,31 +5264,31 @@
           </a:lstStyle>
           <a:p>
             <a:r>
-              <a:rPr lang="en-US" sz="1200" dirty="0" err="1">
+              <a:rPr lang="en-US" sz="900" dirty="0" err="1">
                 <a:solidFill>
                   <a:srgbClr val="7030A0"/>
                 </a:solidFill>
               </a:rPr>
-              <a:t>updatePerson</a:t>
-            </a:r>
-            <a:r>
-              <a:rPr lang="en-US" sz="1200" dirty="0">
+              <a:t>getPersonList</a:t>
+            </a:r>
+            <a:r>
+              <a:rPr lang="en-US" sz="900" dirty="0">
                 <a:solidFill>
                   <a:srgbClr val="7030A0"/>
                 </a:solidFill>
               </a:rPr>
               <a:t>()</a:t>
             </a:r>
-            <a:endParaRPr lang="en-US" sz="1200" dirty="0"/>
+            <a:endParaRPr lang="en-US" sz="900" dirty="0"/>
           </a:p>
         </p:txBody>
       </p:sp>
       <p:cxnSp>
         <p:nvCxnSpPr>
-          <p:cNvPr id="92" name="Straight Arrow Connector 91">
+          <p:cNvPr id="48" name="Straight Arrow Connector 47">
             <a:extLst>
               <a:ext uri="{FF2B5EF4-FFF2-40B4-BE49-F238E27FC236}">
-                <a16:creationId xmlns:a16="http://schemas.microsoft.com/office/drawing/2014/main" id="{9E639DAE-A111-488C-AAC8-142CC27CD857}"/>
+                <a16:creationId xmlns:a16="http://schemas.microsoft.com/office/drawing/2014/main" id="{C6281469-FA1C-4E7F-B5CE-0CB45DE38EB2}"/>
               </a:ext>
             </a:extLst>
           </p:cNvPr>
@@ -5356,8 +5299,464 @@
         </p:nvCxnSpPr>
         <p:spPr>
           <a:xfrm>
-            <a:off x="6810376" y="5348109"/>
-            <a:ext cx="1233970" cy="0"/>
+            <a:off x="6429415" y="2596502"/>
+            <a:ext cx="1284506" cy="0"/>
+          </a:xfrm>
+          <a:prstGeom prst="straightConnector1">
+            <a:avLst/>
+          </a:prstGeom>
+          <a:ln w="19050">
+            <a:solidFill>
+              <a:srgbClr val="0070C0"/>
+            </a:solidFill>
+            <a:tailEnd type="arrow"/>
+          </a:ln>
+        </p:spPr>
+        <p:style>
+          <a:lnRef idx="1">
+            <a:schemeClr val="accent1"/>
+          </a:lnRef>
+          <a:fillRef idx="0">
+            <a:schemeClr val="accent1"/>
+          </a:fillRef>
+          <a:effectRef idx="0">
+            <a:schemeClr val="accent1"/>
+          </a:effectRef>
+          <a:fontRef idx="minor">
+            <a:schemeClr val="tx1"/>
+          </a:fontRef>
+        </p:style>
+      </p:cxnSp>
+      <p:sp>
+        <p:nvSpPr>
+          <p:cNvPr id="51" name="Rectangle 50">
+            <a:extLst>
+              <a:ext uri="{FF2B5EF4-FFF2-40B4-BE49-F238E27FC236}">
+                <a16:creationId xmlns:a16="http://schemas.microsoft.com/office/drawing/2014/main" id="{2C0B10AA-7D69-4E49-8754-872315DEDF5E}"/>
+              </a:ext>
+            </a:extLst>
+          </p:cNvPr>
+          <p:cNvSpPr/>
+          <p:nvPr/>
+        </p:nvSpPr>
+        <p:spPr>
+          <a:xfrm>
+            <a:off x="7710565" y="2589814"/>
+            <a:ext cx="104298" cy="410270"/>
+          </a:xfrm>
+          <a:prstGeom prst="rect">
+            <a:avLst/>
+          </a:prstGeom>
+          <a:solidFill>
+            <a:srgbClr val="7030A0"/>
+          </a:solidFill>
+          <a:ln>
+            <a:solidFill>
+              <a:srgbClr val="7030A0"/>
+            </a:solidFill>
+          </a:ln>
+          <a:effectLst/>
+        </p:spPr>
+        <p:style>
+          <a:lnRef idx="1">
+            <a:schemeClr val="accent3"/>
+          </a:lnRef>
+          <a:fillRef idx="2">
+            <a:schemeClr val="accent3"/>
+          </a:fillRef>
+          <a:effectRef idx="1">
+            <a:schemeClr val="accent3"/>
+          </a:effectRef>
+          <a:fontRef idx="minor">
+            <a:schemeClr val="dk1"/>
+          </a:fontRef>
+        </p:style>
+        <p:txBody>
+          <a:bodyPr rtlCol="0" anchor="ctr"/>
+          <a:lstStyle/>
+          <a:p>
+            <a:pPr algn="ctr"/>
+            <a:endParaRPr lang="en-SG" sz="1050"/>
+          </a:p>
+        </p:txBody>
+      </p:sp>
+      <p:cxnSp>
+        <p:nvCxnSpPr>
+          <p:cNvPr id="54" name="Straight Arrow Connector 53">
+            <a:extLst>
+              <a:ext uri="{FF2B5EF4-FFF2-40B4-BE49-F238E27FC236}">
+                <a16:creationId xmlns:a16="http://schemas.microsoft.com/office/drawing/2014/main" id="{81192F1F-1380-4A34-9F90-C579744AD5C0}"/>
+              </a:ext>
+            </a:extLst>
+          </p:cNvPr>
+          <p:cNvCxnSpPr>
+            <a:cxnSpLocks/>
+            <a:endCxn id="51" idx="2"/>
+          </p:cNvCxnSpPr>
+          <p:nvPr/>
+        </p:nvCxnSpPr>
+        <p:spPr>
+          <a:xfrm>
+            <a:off x="6404700" y="3000084"/>
+            <a:ext cx="1358015" cy="0"/>
+          </a:xfrm>
+          <a:prstGeom prst="straightConnector1">
+            <a:avLst/>
+          </a:prstGeom>
+          <a:ln w="19050">
+            <a:solidFill>
+              <a:srgbClr val="7030A0"/>
+            </a:solidFill>
+            <a:prstDash val="sysDash"/>
+            <a:headEnd type="arrow" w="med" len="med"/>
+            <a:tailEnd type="none" w="med" len="med"/>
+          </a:ln>
+        </p:spPr>
+        <p:style>
+          <a:lnRef idx="1">
+            <a:schemeClr val="accent1"/>
+          </a:lnRef>
+          <a:fillRef idx="0">
+            <a:schemeClr val="accent1"/>
+          </a:fillRef>
+          <a:effectRef idx="0">
+            <a:schemeClr val="accent1"/>
+          </a:effectRef>
+          <a:fontRef idx="minor">
+            <a:schemeClr val="tx1"/>
+          </a:fontRef>
+        </p:style>
+      </p:cxnSp>
+      <p:sp>
+        <p:nvSpPr>
+          <p:cNvPr id="59" name="TextBox 58">
+            <a:extLst>
+              <a:ext uri="{FF2B5EF4-FFF2-40B4-BE49-F238E27FC236}">
+                <a16:creationId xmlns:a16="http://schemas.microsoft.com/office/drawing/2014/main" id="{5F737D85-A623-40DD-934F-95C475A380FE}"/>
+              </a:ext>
+            </a:extLst>
+          </p:cNvPr>
+          <p:cNvSpPr txBox="1"/>
+          <p:nvPr/>
+        </p:nvSpPr>
+        <p:spPr>
+          <a:xfrm>
+            <a:off x="7662869" y="3314558"/>
+            <a:ext cx="148415" cy="246221"/>
+          </a:xfrm>
+          <a:prstGeom prst="rect">
+            <a:avLst/>
+          </a:prstGeom>
+          <a:noFill/>
+        </p:spPr>
+        <p:txBody>
+          <a:bodyPr wrap="square" lIns="0" tIns="0" rIns="0" bIns="0" rtlCol="0">
+            <a:spAutoFit/>
+          </a:bodyPr>
+          <a:lstStyle>
+            <a:defPPr>
+              <a:defRPr lang="en-US"/>
+            </a:defPPr>
+            <a:lvl1pPr algn="r">
+              <a:defRPr sz="1400">
+                <a:solidFill>
+                  <a:srgbClr val="0070C0"/>
+                </a:solidFill>
+              </a:defRPr>
+            </a:lvl1pPr>
+          </a:lstStyle>
+          <a:p>
+            <a:r>
+              <a:rPr lang="en-US" sz="1600" dirty="0">
+                <a:solidFill>
+                  <a:srgbClr val="7030A0"/>
+                </a:solidFill>
+              </a:rPr>
+              <a:t>X</a:t>
+            </a:r>
+            <a:endParaRPr lang="en-US" sz="1600" dirty="0"/>
+          </a:p>
+        </p:txBody>
+      </p:sp>
+      <p:sp>
+        <p:nvSpPr>
+          <p:cNvPr id="60" name="Rectangle 62">
+            <a:extLst>
+              <a:ext uri="{FF2B5EF4-FFF2-40B4-BE49-F238E27FC236}">
+                <a16:creationId xmlns:a16="http://schemas.microsoft.com/office/drawing/2014/main" id="{330AF691-0A89-4E54-A8BD-B94443785C5C}"/>
+              </a:ext>
+            </a:extLst>
+          </p:cNvPr>
+          <p:cNvSpPr/>
+          <p:nvPr/>
+        </p:nvSpPr>
+        <p:spPr>
+          <a:xfrm>
+            <a:off x="4408666" y="973518"/>
+            <a:ext cx="1307458" cy="143942"/>
+          </a:xfrm>
+          <a:prstGeom prst="rect">
+            <a:avLst/>
+          </a:prstGeom>
+          <a:solidFill>
+            <a:srgbClr val="0070C0"/>
+          </a:solidFill>
+          <a:ln w="19050">
+            <a:solidFill>
+              <a:srgbClr val="0070C0"/>
+            </a:solidFill>
+          </a:ln>
+          <a:effectLst/>
+        </p:spPr>
+        <p:style>
+          <a:lnRef idx="1">
+            <a:schemeClr val="accent2"/>
+          </a:lnRef>
+          <a:fillRef idx="2">
+            <a:schemeClr val="accent2"/>
+          </a:fillRef>
+          <a:effectRef idx="1">
+            <a:schemeClr val="accent2"/>
+          </a:effectRef>
+          <a:fontRef idx="minor">
+            <a:schemeClr val="dk1"/>
+          </a:fontRef>
+        </p:style>
+        <p:txBody>
+          <a:bodyPr rtlCol="0" anchor="ctr"/>
+          <a:lstStyle/>
+          <a:p>
+            <a:pPr algn="ctr"/>
+            <a:r>
+              <a:rPr lang="en-US" sz="1000" dirty="0">
+                <a:solidFill>
+                  <a:schemeClr val="bg1"/>
+                </a:solidFill>
+              </a:rPr>
+              <a:t>u:UnmarkCommand</a:t>
+            </a:r>
+            <a:endParaRPr lang="en-SG" sz="1000" dirty="0">
+              <a:solidFill>
+                <a:schemeClr val="bg1"/>
+              </a:solidFill>
+            </a:endParaRPr>
+          </a:p>
+        </p:txBody>
+      </p:sp>
+      <p:cxnSp>
+        <p:nvCxnSpPr>
+          <p:cNvPr id="61" name="Straight Connector 60">
+            <a:extLst>
+              <a:ext uri="{FF2B5EF4-FFF2-40B4-BE49-F238E27FC236}">
+                <a16:creationId xmlns:a16="http://schemas.microsoft.com/office/drawing/2014/main" id="{53F830B9-B0AB-4258-9218-E3303B9F733A}"/>
+              </a:ext>
+            </a:extLst>
+          </p:cNvPr>
+          <p:cNvCxnSpPr>
+            <a:cxnSpLocks/>
+          </p:cNvCxnSpPr>
+          <p:nvPr/>
+        </p:nvCxnSpPr>
+        <p:spPr>
+          <a:xfrm flipH="1">
+            <a:off x="5145379" y="1128345"/>
+            <a:ext cx="4389" cy="5358180"/>
+          </a:xfrm>
+          <a:prstGeom prst="line">
+            <a:avLst/>
+          </a:prstGeom>
+          <a:ln w="19050">
+            <a:solidFill>
+              <a:srgbClr val="0070C0"/>
+            </a:solidFill>
+            <a:prstDash val="sysDash"/>
+          </a:ln>
+          <a:effectLst/>
+        </p:spPr>
+        <p:style>
+          <a:lnRef idx="1">
+            <a:schemeClr val="accent1"/>
+          </a:lnRef>
+          <a:fillRef idx="2">
+            <a:schemeClr val="accent1"/>
+          </a:fillRef>
+          <a:effectRef idx="1">
+            <a:schemeClr val="accent1"/>
+          </a:effectRef>
+          <a:fontRef idx="minor">
+            <a:schemeClr val="dk1"/>
+          </a:fontRef>
+        </p:style>
+      </p:cxnSp>
+      <p:sp>
+        <p:nvSpPr>
+          <p:cNvPr id="72" name="Rectangle 71">
+            <a:extLst>
+              <a:ext uri="{FF2B5EF4-FFF2-40B4-BE49-F238E27FC236}">
+                <a16:creationId xmlns:a16="http://schemas.microsoft.com/office/drawing/2014/main" id="{BB316B8F-260B-443F-8805-7DDBA9140FCE}"/>
+              </a:ext>
+            </a:extLst>
+          </p:cNvPr>
+          <p:cNvSpPr/>
+          <p:nvPr/>
+        </p:nvSpPr>
+        <p:spPr>
+          <a:xfrm>
+            <a:off x="5081296" y="2075894"/>
+            <a:ext cx="125907" cy="4086447"/>
+          </a:xfrm>
+          <a:prstGeom prst="rect">
+            <a:avLst/>
+          </a:prstGeom>
+          <a:solidFill>
+            <a:srgbClr val="0070C0"/>
+          </a:solidFill>
+          <a:ln>
+            <a:solidFill>
+              <a:srgbClr val="0070C0"/>
+            </a:solidFill>
+          </a:ln>
+          <a:effectLst/>
+        </p:spPr>
+        <p:style>
+          <a:lnRef idx="1">
+            <a:schemeClr val="accent3"/>
+          </a:lnRef>
+          <a:fillRef idx="2">
+            <a:schemeClr val="accent3"/>
+          </a:fillRef>
+          <a:effectRef idx="1">
+            <a:schemeClr val="accent3"/>
+          </a:effectRef>
+          <a:fontRef idx="minor">
+            <a:schemeClr val="dk1"/>
+          </a:fontRef>
+        </p:style>
+        <p:txBody>
+          <a:bodyPr rtlCol="0" anchor="ctr"/>
+          <a:lstStyle/>
+          <a:p>
+            <a:pPr algn="ctr"/>
+            <a:endParaRPr lang="en-SG" sz="1050"/>
+          </a:p>
+        </p:txBody>
+      </p:sp>
+      <p:cxnSp>
+        <p:nvCxnSpPr>
+          <p:cNvPr id="73" name="Straight Arrow Connector 72">
+            <a:extLst>
+              <a:ext uri="{FF2B5EF4-FFF2-40B4-BE49-F238E27FC236}">
+                <a16:creationId xmlns:a16="http://schemas.microsoft.com/office/drawing/2014/main" id="{27734C2C-B823-43B0-9994-BBDBA28B5B76}"/>
+              </a:ext>
+            </a:extLst>
+          </p:cNvPr>
+          <p:cNvCxnSpPr>
+            <a:cxnSpLocks/>
+          </p:cNvCxnSpPr>
+          <p:nvPr/>
+        </p:nvCxnSpPr>
+        <p:spPr>
+          <a:xfrm flipV="1">
+            <a:off x="5204880" y="2489621"/>
+            <a:ext cx="1134897" cy="14054"/>
+          </a:xfrm>
+          <a:prstGeom prst="straightConnector1">
+            <a:avLst/>
+          </a:prstGeom>
+          <a:ln w="19050">
+            <a:solidFill>
+              <a:srgbClr val="0070C0"/>
+            </a:solidFill>
+            <a:tailEnd type="arrow"/>
+          </a:ln>
+        </p:spPr>
+        <p:style>
+          <a:lnRef idx="1">
+            <a:schemeClr val="accent1"/>
+          </a:lnRef>
+          <a:fillRef idx="0">
+            <a:schemeClr val="accent1"/>
+          </a:fillRef>
+          <a:effectRef idx="0">
+            <a:schemeClr val="accent1"/>
+          </a:effectRef>
+          <a:fontRef idx="minor">
+            <a:schemeClr val="tx1"/>
+          </a:fontRef>
+        </p:style>
+      </p:cxnSp>
+      <p:sp>
+        <p:nvSpPr>
+          <p:cNvPr id="76" name="Rectangle 75">
+            <a:extLst>
+              <a:ext uri="{FF2B5EF4-FFF2-40B4-BE49-F238E27FC236}">
+                <a16:creationId xmlns:a16="http://schemas.microsoft.com/office/drawing/2014/main" id="{ACECC2DD-DADB-4214-B964-4215B5C8D379}"/>
+              </a:ext>
+            </a:extLst>
+          </p:cNvPr>
+          <p:cNvSpPr/>
+          <p:nvPr/>
+        </p:nvSpPr>
+        <p:spPr>
+          <a:xfrm>
+            <a:off x="5086637" y="1175960"/>
+            <a:ext cx="118067" cy="335512"/>
+          </a:xfrm>
+          <a:prstGeom prst="rect">
+            <a:avLst/>
+          </a:prstGeom>
+          <a:solidFill>
+            <a:srgbClr val="0070C0"/>
+          </a:solidFill>
+          <a:ln>
+            <a:solidFill>
+              <a:srgbClr val="0070C0"/>
+            </a:solidFill>
+          </a:ln>
+          <a:effectLst/>
+        </p:spPr>
+        <p:style>
+          <a:lnRef idx="1">
+            <a:schemeClr val="accent3"/>
+          </a:lnRef>
+          <a:fillRef idx="2">
+            <a:schemeClr val="accent3"/>
+          </a:fillRef>
+          <a:effectRef idx="1">
+            <a:schemeClr val="accent3"/>
+          </a:effectRef>
+          <a:fontRef idx="minor">
+            <a:schemeClr val="dk1"/>
+          </a:fontRef>
+        </p:style>
+        <p:txBody>
+          <a:bodyPr rtlCol="0" anchor="ctr"/>
+          <a:lstStyle/>
+          <a:p>
+            <a:pPr algn="ctr"/>
+            <a:endParaRPr lang="en-SG" sz="1050"/>
+          </a:p>
+        </p:txBody>
+      </p:sp>
+      <p:cxnSp>
+        <p:nvCxnSpPr>
+          <p:cNvPr id="77" name="Straight Arrow Connector 76">
+            <a:extLst>
+              <a:ext uri="{FF2B5EF4-FFF2-40B4-BE49-F238E27FC236}">
+                <a16:creationId xmlns:a16="http://schemas.microsoft.com/office/drawing/2014/main" id="{33E01842-3092-4C56-8C38-AAECE9A68D4F}"/>
+              </a:ext>
+            </a:extLst>
+          </p:cNvPr>
+          <p:cNvCxnSpPr>
+            <a:cxnSpLocks/>
+            <a:endCxn id="76" idx="0"/>
+          </p:cNvCxnSpPr>
+          <p:nvPr/>
+        </p:nvCxnSpPr>
+        <p:spPr>
+          <a:xfrm flipV="1">
+            <a:off x="4104698" y="1175960"/>
+            <a:ext cx="1040973" cy="22296"/>
           </a:xfrm>
           <a:prstGeom prst="straightConnector1">
             <a:avLst/>
@@ -5386,10 +5785,57 @@
       </p:cxnSp>
       <p:cxnSp>
         <p:nvCxnSpPr>
-          <p:cNvPr id="94" name="Straight Arrow Connector 93">
+          <p:cNvPr id="84" name="Straight Arrow Connector 83">
             <a:extLst>
               <a:ext uri="{FF2B5EF4-FFF2-40B4-BE49-F238E27FC236}">
-                <a16:creationId xmlns:a16="http://schemas.microsoft.com/office/drawing/2014/main" id="{AFEDC611-F170-44F8-9237-E19CF6BF93C7}"/>
+                <a16:creationId xmlns:a16="http://schemas.microsoft.com/office/drawing/2014/main" id="{33789AB1-C4AC-4023-9530-8FAE1BF230CB}"/>
+              </a:ext>
+            </a:extLst>
+          </p:cNvPr>
+          <p:cNvCxnSpPr>
+            <a:cxnSpLocks/>
+            <a:endCxn id="76" idx="2"/>
+          </p:cNvCxnSpPr>
+          <p:nvPr/>
+        </p:nvCxnSpPr>
+        <p:spPr>
+          <a:xfrm>
+            <a:off x="4123358" y="1492090"/>
+            <a:ext cx="1022313" cy="19382"/>
+          </a:xfrm>
+          <a:prstGeom prst="straightConnector1">
+            <a:avLst/>
+          </a:prstGeom>
+          <a:ln w="19050">
+            <a:solidFill>
+              <a:srgbClr val="0070C0"/>
+            </a:solidFill>
+            <a:prstDash val="sysDash"/>
+            <a:headEnd type="arrow" w="med" len="med"/>
+            <a:tailEnd type="none" w="med" len="med"/>
+          </a:ln>
+        </p:spPr>
+        <p:style>
+          <a:lnRef idx="1">
+            <a:schemeClr val="accent1"/>
+          </a:lnRef>
+          <a:fillRef idx="0">
+            <a:schemeClr val="accent1"/>
+          </a:fillRef>
+          <a:effectRef idx="0">
+            <a:schemeClr val="accent1"/>
+          </a:effectRef>
+          <a:fontRef idx="minor">
+            <a:schemeClr val="tx1"/>
+          </a:fontRef>
+        </p:style>
+      </p:cxnSp>
+      <p:cxnSp>
+        <p:nvCxnSpPr>
+          <p:cNvPr id="85" name="Straight Connector 84">
+            <a:extLst>
+              <a:ext uri="{FF2B5EF4-FFF2-40B4-BE49-F238E27FC236}">
+                <a16:creationId xmlns:a16="http://schemas.microsoft.com/office/drawing/2014/main" id="{1E6460BB-082E-4347-87C6-4E884AA92936}"/>
               </a:ext>
             </a:extLst>
           </p:cNvPr>
@@ -5400,8 +5846,479 @@
         </p:nvCxnSpPr>
         <p:spPr>
           <a:xfrm>
-            <a:off x="6776178" y="5882600"/>
-            <a:ext cx="1243612" cy="11843"/>
+            <a:off x="4064511" y="856073"/>
+            <a:ext cx="0" cy="850320"/>
+          </a:xfrm>
+          <a:prstGeom prst="line">
+            <a:avLst/>
+          </a:prstGeom>
+          <a:ln w="19050">
+            <a:solidFill>
+              <a:srgbClr val="0070C0"/>
+            </a:solidFill>
+            <a:prstDash val="sysDash"/>
+          </a:ln>
+          <a:effectLst/>
+        </p:spPr>
+        <p:style>
+          <a:lnRef idx="1">
+            <a:schemeClr val="accent1"/>
+          </a:lnRef>
+          <a:fillRef idx="2">
+            <a:schemeClr val="accent1"/>
+          </a:fillRef>
+          <a:effectRef idx="1">
+            <a:schemeClr val="accent1"/>
+          </a:effectRef>
+          <a:fontRef idx="minor">
+            <a:schemeClr val="dk1"/>
+          </a:fontRef>
+        </p:style>
+      </p:cxnSp>
+      <p:sp>
+        <p:nvSpPr>
+          <p:cNvPr id="86" name="TextBox 85">
+            <a:extLst>
+              <a:ext uri="{FF2B5EF4-FFF2-40B4-BE49-F238E27FC236}">
+                <a16:creationId xmlns:a16="http://schemas.microsoft.com/office/drawing/2014/main" id="{AE1A4ED6-DC99-43A7-BD36-E7717E02EF32}"/>
+              </a:ext>
+            </a:extLst>
+          </p:cNvPr>
+          <p:cNvSpPr txBox="1"/>
+          <p:nvPr/>
+        </p:nvSpPr>
+        <p:spPr>
+          <a:xfrm>
+            <a:off x="3969592" y="1545272"/>
+            <a:ext cx="141778" cy="276999"/>
+          </a:xfrm>
+          <a:prstGeom prst="rect">
+            <a:avLst/>
+          </a:prstGeom>
+          <a:noFill/>
+        </p:spPr>
+        <p:txBody>
+          <a:bodyPr wrap="square" lIns="0" tIns="0" rIns="0" bIns="0" rtlCol="0">
+            <a:spAutoFit/>
+          </a:bodyPr>
+          <a:lstStyle>
+            <a:defPPr>
+              <a:defRPr lang="en-US"/>
+            </a:defPPr>
+            <a:lvl1pPr algn="r">
+              <a:defRPr sz="1400">
+                <a:solidFill>
+                  <a:srgbClr val="0070C0"/>
+                </a:solidFill>
+              </a:defRPr>
+            </a:lvl1pPr>
+          </a:lstStyle>
+          <a:p>
+            <a:r>
+              <a:rPr lang="en-US" sz="1800" dirty="0"/>
+              <a:t>x</a:t>
+            </a:r>
+          </a:p>
+        </p:txBody>
+      </p:sp>
+      <p:sp>
+        <p:nvSpPr>
+          <p:cNvPr id="88" name="TextBox 87">
+            <a:extLst>
+              <a:ext uri="{FF2B5EF4-FFF2-40B4-BE49-F238E27FC236}">
+                <a16:creationId xmlns:a16="http://schemas.microsoft.com/office/drawing/2014/main" id="{87D6091A-2DD0-49D5-9549-C5CD28FFB560}"/>
+              </a:ext>
+            </a:extLst>
+          </p:cNvPr>
+          <p:cNvSpPr txBox="1"/>
+          <p:nvPr/>
+        </p:nvSpPr>
+        <p:spPr>
+          <a:xfrm>
+            <a:off x="2782340" y="1683298"/>
+            <a:ext cx="141778" cy="276999"/>
+          </a:xfrm>
+          <a:prstGeom prst="rect">
+            <a:avLst/>
+          </a:prstGeom>
+          <a:noFill/>
+        </p:spPr>
+        <p:txBody>
+          <a:bodyPr wrap="square" lIns="0" tIns="0" rIns="0" bIns="0" rtlCol="0">
+            <a:spAutoFit/>
+          </a:bodyPr>
+          <a:lstStyle>
+            <a:defPPr>
+              <a:defRPr lang="en-US"/>
+            </a:defPPr>
+            <a:lvl1pPr algn="r">
+              <a:defRPr sz="1400">
+                <a:solidFill>
+                  <a:srgbClr val="0070C0"/>
+                </a:solidFill>
+              </a:defRPr>
+            </a:lvl1pPr>
+          </a:lstStyle>
+          <a:p>
+            <a:r>
+              <a:rPr lang="en-US" sz="1800" dirty="0"/>
+              <a:t>x</a:t>
+            </a:r>
+          </a:p>
+        </p:txBody>
+      </p:sp>
+      <p:sp>
+        <p:nvSpPr>
+          <p:cNvPr id="95" name="Rectangle 94">
+            <a:extLst>
+              <a:ext uri="{FF2B5EF4-FFF2-40B4-BE49-F238E27FC236}">
+                <a16:creationId xmlns:a16="http://schemas.microsoft.com/office/drawing/2014/main" id="{F46D1B68-25E8-46C3-822B-17029151FFD3}"/>
+              </a:ext>
+            </a:extLst>
+          </p:cNvPr>
+          <p:cNvSpPr/>
+          <p:nvPr/>
+        </p:nvSpPr>
+        <p:spPr>
+          <a:xfrm>
+            <a:off x="5240086" y="3656803"/>
+            <a:ext cx="118067" cy="335512"/>
+          </a:xfrm>
+          <a:prstGeom prst="rect">
+            <a:avLst/>
+          </a:prstGeom>
+          <a:solidFill>
+            <a:srgbClr val="0070C0"/>
+          </a:solidFill>
+          <a:ln>
+            <a:solidFill>
+              <a:srgbClr val="0070C0"/>
+            </a:solidFill>
+          </a:ln>
+          <a:effectLst/>
+        </p:spPr>
+        <p:style>
+          <a:lnRef idx="1">
+            <a:schemeClr val="accent3"/>
+          </a:lnRef>
+          <a:fillRef idx="2">
+            <a:schemeClr val="accent3"/>
+          </a:fillRef>
+          <a:effectRef idx="1">
+            <a:schemeClr val="accent3"/>
+          </a:effectRef>
+          <a:fontRef idx="minor">
+            <a:schemeClr val="dk1"/>
+          </a:fontRef>
+        </p:style>
+        <p:txBody>
+          <a:bodyPr rtlCol="0" anchor="ctr"/>
+          <a:lstStyle/>
+          <a:p>
+            <a:pPr algn="ctr"/>
+            <a:endParaRPr lang="en-SG" sz="1050"/>
+          </a:p>
+        </p:txBody>
+      </p:sp>
+      <p:sp>
+        <p:nvSpPr>
+          <p:cNvPr id="104" name="Arrow: Curved Left 103">
+            <a:extLst>
+              <a:ext uri="{FF2B5EF4-FFF2-40B4-BE49-F238E27FC236}">
+                <a16:creationId xmlns:a16="http://schemas.microsoft.com/office/drawing/2014/main" id="{790EE58A-CD5F-4F5C-BCAC-9E86E4CD392E}"/>
+              </a:ext>
+            </a:extLst>
+          </p:cNvPr>
+          <p:cNvSpPr/>
+          <p:nvPr/>
+        </p:nvSpPr>
+        <p:spPr>
+          <a:xfrm>
+            <a:off x="5276277" y="3486265"/>
+            <a:ext cx="354280" cy="309791"/>
+          </a:xfrm>
+          <a:prstGeom prst="curvedLeftArrow">
+            <a:avLst/>
+          </a:prstGeom>
+        </p:spPr>
+        <p:style>
+          <a:lnRef idx="2">
+            <a:schemeClr val="accent1">
+              <a:shade val="50000"/>
+            </a:schemeClr>
+          </a:lnRef>
+          <a:fillRef idx="1">
+            <a:schemeClr val="accent1"/>
+          </a:fillRef>
+          <a:effectRef idx="0">
+            <a:schemeClr val="accent1"/>
+          </a:effectRef>
+          <a:fontRef idx="minor">
+            <a:schemeClr val="lt1"/>
+          </a:fontRef>
+        </p:style>
+        <p:txBody>
+          <a:bodyPr rtlCol="0" anchor="ctr"/>
+          <a:lstStyle/>
+          <a:p>
+            <a:pPr algn="ctr"/>
+            <a:endParaRPr lang="en-SG">
+              <a:solidFill>
+                <a:schemeClr val="tx1"/>
+              </a:solidFill>
+            </a:endParaRPr>
+          </a:p>
+        </p:txBody>
+      </p:sp>
+      <p:sp>
+        <p:nvSpPr>
+          <p:cNvPr id="105" name="TextBox 104">
+            <a:extLst>
+              <a:ext uri="{FF2B5EF4-FFF2-40B4-BE49-F238E27FC236}">
+                <a16:creationId xmlns:a16="http://schemas.microsoft.com/office/drawing/2014/main" id="{9DB98670-7582-4FA4-95BF-3EC1AF59BD3A}"/>
+              </a:ext>
+            </a:extLst>
+          </p:cNvPr>
+          <p:cNvSpPr txBox="1"/>
+          <p:nvPr/>
+        </p:nvSpPr>
+        <p:spPr>
+          <a:xfrm>
+            <a:off x="5404212" y="3771491"/>
+            <a:ext cx="632216" cy="276999"/>
+          </a:xfrm>
+          <a:prstGeom prst="rect">
+            <a:avLst/>
+          </a:prstGeom>
+          <a:noFill/>
+        </p:spPr>
+        <p:txBody>
+          <a:bodyPr wrap="square" lIns="0" tIns="0" rIns="0" bIns="0" rtlCol="0">
+            <a:spAutoFit/>
+          </a:bodyPr>
+          <a:lstStyle>
+            <a:defPPr>
+              <a:defRPr lang="en-US"/>
+            </a:defPPr>
+            <a:lvl1pPr algn="r">
+              <a:defRPr sz="1400">
+                <a:solidFill>
+                  <a:srgbClr val="0070C0"/>
+                </a:solidFill>
+              </a:defRPr>
+            </a:lvl1pPr>
+          </a:lstStyle>
+          <a:p>
+            <a:r>
+              <a:rPr lang="en-US" sz="900" dirty="0" err="1">
+                <a:solidFill>
+                  <a:srgbClr val="7030A0"/>
+                </a:solidFill>
+              </a:rPr>
+              <a:t>retrieveIndex</a:t>
+            </a:r>
+            <a:r>
+              <a:rPr lang="en-US" sz="900" dirty="0">
+                <a:solidFill>
+                  <a:srgbClr val="7030A0"/>
+                </a:solidFill>
+              </a:rPr>
+              <a:t>(</a:t>
+            </a:r>
+            <a:r>
+              <a:rPr lang="en-US" sz="900" dirty="0" err="1">
+                <a:solidFill>
+                  <a:srgbClr val="7030A0"/>
+                </a:solidFill>
+              </a:rPr>
+              <a:t>guestList</a:t>
+            </a:r>
+            <a:r>
+              <a:rPr lang="en-US" sz="900" dirty="0">
+                <a:solidFill>
+                  <a:srgbClr val="7030A0"/>
+                </a:solidFill>
+              </a:rPr>
+              <a:t>)</a:t>
+            </a:r>
+            <a:endParaRPr lang="en-US" sz="900" dirty="0"/>
+          </a:p>
+        </p:txBody>
+      </p:sp>
+      <p:sp>
+        <p:nvSpPr>
+          <p:cNvPr id="112" name="Rectangle 111">
+            <a:extLst>
+              <a:ext uri="{FF2B5EF4-FFF2-40B4-BE49-F238E27FC236}">
+                <a16:creationId xmlns:a16="http://schemas.microsoft.com/office/drawing/2014/main" id="{0AB91657-A1B0-49CD-9181-35882498BA98}"/>
+              </a:ext>
+            </a:extLst>
+          </p:cNvPr>
+          <p:cNvSpPr/>
+          <p:nvPr/>
+        </p:nvSpPr>
+        <p:spPr>
+          <a:xfrm>
+            <a:off x="6359235" y="4566723"/>
+            <a:ext cx="104298" cy="626151"/>
+          </a:xfrm>
+          <a:prstGeom prst="rect">
+            <a:avLst/>
+          </a:prstGeom>
+          <a:solidFill>
+            <a:srgbClr val="7030A0"/>
+          </a:solidFill>
+          <a:ln>
+            <a:solidFill>
+              <a:srgbClr val="7030A0"/>
+            </a:solidFill>
+          </a:ln>
+          <a:effectLst/>
+        </p:spPr>
+        <p:style>
+          <a:lnRef idx="1">
+            <a:schemeClr val="accent3"/>
+          </a:lnRef>
+          <a:fillRef idx="2">
+            <a:schemeClr val="accent3"/>
+          </a:fillRef>
+          <a:effectRef idx="1">
+            <a:schemeClr val="accent3"/>
+          </a:effectRef>
+          <a:fontRef idx="minor">
+            <a:schemeClr val="dk1"/>
+          </a:fontRef>
+        </p:style>
+        <p:txBody>
+          <a:bodyPr rtlCol="0" anchor="ctr"/>
+          <a:lstStyle/>
+          <a:p>
+            <a:pPr algn="ctr"/>
+            <a:endParaRPr lang="en-SG" sz="1050"/>
+          </a:p>
+        </p:txBody>
+      </p:sp>
+      <p:sp>
+        <p:nvSpPr>
+          <p:cNvPr id="113" name="TextBox 112">
+            <a:extLst>
+              <a:ext uri="{FF2B5EF4-FFF2-40B4-BE49-F238E27FC236}">
+                <a16:creationId xmlns:a16="http://schemas.microsoft.com/office/drawing/2014/main" id="{30B0F6C4-D8B9-4647-B7B4-6AD4DEC76AEA}"/>
+              </a:ext>
+            </a:extLst>
+          </p:cNvPr>
+          <p:cNvSpPr txBox="1"/>
+          <p:nvPr/>
+        </p:nvSpPr>
+        <p:spPr>
+          <a:xfrm>
+            <a:off x="5202110" y="4441006"/>
+            <a:ext cx="845715" cy="138499"/>
+          </a:xfrm>
+          <a:prstGeom prst="rect">
+            <a:avLst/>
+          </a:prstGeom>
+          <a:noFill/>
+        </p:spPr>
+        <p:txBody>
+          <a:bodyPr wrap="square" lIns="0" tIns="0" rIns="0" bIns="0" rtlCol="0">
+            <a:spAutoFit/>
+          </a:bodyPr>
+          <a:lstStyle>
+            <a:defPPr>
+              <a:defRPr lang="en-US"/>
+            </a:defPPr>
+            <a:lvl1pPr algn="r">
+              <a:defRPr sz="1400">
+                <a:solidFill>
+                  <a:srgbClr val="0070C0"/>
+                </a:solidFill>
+              </a:defRPr>
+            </a:lvl1pPr>
+          </a:lstStyle>
+          <a:p>
+            <a:r>
+              <a:rPr lang="en-US" sz="900" dirty="0" err="1">
+                <a:solidFill>
+                  <a:srgbClr val="7030A0"/>
+                </a:solidFill>
+              </a:rPr>
+              <a:t>updatePerson</a:t>
+            </a:r>
+            <a:r>
+              <a:rPr lang="en-US" sz="900" dirty="0">
+                <a:solidFill>
+                  <a:srgbClr val="7030A0"/>
+                </a:solidFill>
+              </a:rPr>
+              <a:t>()</a:t>
+            </a:r>
+            <a:endParaRPr lang="en-US" sz="900" dirty="0"/>
+          </a:p>
+        </p:txBody>
+      </p:sp>
+      <p:cxnSp>
+        <p:nvCxnSpPr>
+          <p:cNvPr id="114" name="Straight Arrow Connector 113">
+            <a:extLst>
+              <a:ext uri="{FF2B5EF4-FFF2-40B4-BE49-F238E27FC236}">
+                <a16:creationId xmlns:a16="http://schemas.microsoft.com/office/drawing/2014/main" id="{28535D02-3697-4B1C-8FE0-78D0AAFD5D4E}"/>
+              </a:ext>
+            </a:extLst>
+          </p:cNvPr>
+          <p:cNvCxnSpPr>
+            <a:cxnSpLocks/>
+          </p:cNvCxnSpPr>
+          <p:nvPr/>
+        </p:nvCxnSpPr>
+        <p:spPr>
+          <a:xfrm>
+            <a:off x="5186379" y="4590390"/>
+            <a:ext cx="1173751" cy="0"/>
+          </a:xfrm>
+          <a:prstGeom prst="straightConnector1">
+            <a:avLst/>
+          </a:prstGeom>
+          <a:ln w="19050">
+            <a:solidFill>
+              <a:srgbClr val="0070C0"/>
+            </a:solidFill>
+            <a:tailEnd type="arrow"/>
+          </a:ln>
+        </p:spPr>
+        <p:style>
+          <a:lnRef idx="1">
+            <a:schemeClr val="accent1"/>
+          </a:lnRef>
+          <a:fillRef idx="0">
+            <a:schemeClr val="accent1"/>
+          </a:fillRef>
+          <a:effectRef idx="0">
+            <a:schemeClr val="accent1"/>
+          </a:effectRef>
+          <a:fontRef idx="minor">
+            <a:schemeClr val="tx1"/>
+          </a:fontRef>
+        </p:style>
+      </p:cxnSp>
+      <p:cxnSp>
+        <p:nvCxnSpPr>
+          <p:cNvPr id="115" name="Straight Arrow Connector 114">
+            <a:extLst>
+              <a:ext uri="{FF2B5EF4-FFF2-40B4-BE49-F238E27FC236}">
+                <a16:creationId xmlns:a16="http://schemas.microsoft.com/office/drawing/2014/main" id="{0D6D8B7D-C997-4F0E-8E74-642202C8BD74}"/>
+              </a:ext>
+            </a:extLst>
+          </p:cNvPr>
+          <p:cNvCxnSpPr>
+            <a:cxnSpLocks/>
+          </p:cNvCxnSpPr>
+          <p:nvPr/>
+        </p:nvCxnSpPr>
+        <p:spPr>
+          <a:xfrm>
+            <a:off x="5305582" y="5181328"/>
+            <a:ext cx="1105802" cy="11546"/>
           </a:xfrm>
           <a:prstGeom prst="straightConnector1">
             <a:avLst/>
@@ -5430,6 +6347,371 @@
           </a:fontRef>
         </p:style>
       </p:cxnSp>
+      <p:sp>
+        <p:nvSpPr>
+          <p:cNvPr id="116" name="Rectangle 115">
+            <a:extLst>
+              <a:ext uri="{FF2B5EF4-FFF2-40B4-BE49-F238E27FC236}">
+                <a16:creationId xmlns:a16="http://schemas.microsoft.com/office/drawing/2014/main" id="{C002DA70-8B3B-4D19-B2B8-A63C148CF431}"/>
+              </a:ext>
+            </a:extLst>
+          </p:cNvPr>
+          <p:cNvSpPr/>
+          <p:nvPr/>
+        </p:nvSpPr>
+        <p:spPr>
+          <a:xfrm>
+            <a:off x="6367200" y="5440735"/>
+            <a:ext cx="104298" cy="626151"/>
+          </a:xfrm>
+          <a:prstGeom prst="rect">
+            <a:avLst/>
+          </a:prstGeom>
+          <a:solidFill>
+            <a:srgbClr val="7030A0"/>
+          </a:solidFill>
+          <a:ln>
+            <a:solidFill>
+              <a:srgbClr val="7030A0"/>
+            </a:solidFill>
+          </a:ln>
+          <a:effectLst/>
+        </p:spPr>
+        <p:style>
+          <a:lnRef idx="1">
+            <a:schemeClr val="accent3"/>
+          </a:lnRef>
+          <a:fillRef idx="2">
+            <a:schemeClr val="accent3"/>
+          </a:fillRef>
+          <a:effectRef idx="1">
+            <a:schemeClr val="accent3"/>
+          </a:effectRef>
+          <a:fontRef idx="minor">
+            <a:schemeClr val="dk1"/>
+          </a:fontRef>
+        </p:style>
+        <p:txBody>
+          <a:bodyPr rtlCol="0" anchor="ctr"/>
+          <a:lstStyle/>
+          <a:p>
+            <a:pPr algn="ctr"/>
+            <a:endParaRPr lang="en-SG" sz="1050"/>
+          </a:p>
+        </p:txBody>
+      </p:sp>
+      <p:sp>
+        <p:nvSpPr>
+          <p:cNvPr id="117" name="TextBox 116">
+            <a:extLst>
+              <a:ext uri="{FF2B5EF4-FFF2-40B4-BE49-F238E27FC236}">
+                <a16:creationId xmlns:a16="http://schemas.microsoft.com/office/drawing/2014/main" id="{44F7440F-2A93-4FD5-BEC4-1A275279807B}"/>
+              </a:ext>
+            </a:extLst>
+          </p:cNvPr>
+          <p:cNvSpPr txBox="1"/>
+          <p:nvPr/>
+        </p:nvSpPr>
+        <p:spPr>
+          <a:xfrm>
+            <a:off x="5272141" y="5315045"/>
+            <a:ext cx="1082617" cy="138499"/>
+          </a:xfrm>
+          <a:prstGeom prst="rect">
+            <a:avLst/>
+          </a:prstGeom>
+          <a:noFill/>
+        </p:spPr>
+        <p:txBody>
+          <a:bodyPr wrap="square" lIns="0" tIns="0" rIns="0" bIns="0" rtlCol="0">
+            <a:spAutoFit/>
+          </a:bodyPr>
+          <a:lstStyle>
+            <a:defPPr>
+              <a:defRPr lang="en-US"/>
+            </a:defPPr>
+            <a:lvl1pPr algn="r">
+              <a:defRPr sz="1400">
+                <a:solidFill>
+                  <a:srgbClr val="0070C0"/>
+                </a:solidFill>
+              </a:defRPr>
+            </a:lvl1pPr>
+          </a:lstStyle>
+          <a:p>
+            <a:r>
+              <a:rPr lang="en-US" sz="900" dirty="0" err="1">
+                <a:solidFill>
+                  <a:srgbClr val="7030A0"/>
+                </a:solidFill>
+              </a:rPr>
+              <a:t>commitAddressBook</a:t>
+            </a:r>
+            <a:r>
+              <a:rPr lang="en-US" sz="900" dirty="0">
+                <a:solidFill>
+                  <a:srgbClr val="7030A0"/>
+                </a:solidFill>
+              </a:rPr>
+              <a:t>()</a:t>
+            </a:r>
+            <a:endParaRPr lang="en-US" sz="900" dirty="0"/>
+          </a:p>
+        </p:txBody>
+      </p:sp>
+      <p:cxnSp>
+        <p:nvCxnSpPr>
+          <p:cNvPr id="118" name="Straight Arrow Connector 117">
+            <a:extLst>
+              <a:ext uri="{FF2B5EF4-FFF2-40B4-BE49-F238E27FC236}">
+                <a16:creationId xmlns:a16="http://schemas.microsoft.com/office/drawing/2014/main" id="{29823083-86F6-4201-975C-7CC5C3ED32DB}"/>
+              </a:ext>
+            </a:extLst>
+          </p:cNvPr>
+          <p:cNvCxnSpPr>
+            <a:cxnSpLocks/>
+          </p:cNvCxnSpPr>
+          <p:nvPr/>
+        </p:nvCxnSpPr>
+        <p:spPr>
+          <a:xfrm>
+            <a:off x="5194344" y="5464402"/>
+            <a:ext cx="1173751" cy="0"/>
+          </a:xfrm>
+          <a:prstGeom prst="straightConnector1">
+            <a:avLst/>
+          </a:prstGeom>
+          <a:ln w="19050">
+            <a:solidFill>
+              <a:srgbClr val="0070C0"/>
+            </a:solidFill>
+            <a:tailEnd type="arrow"/>
+          </a:ln>
+        </p:spPr>
+        <p:style>
+          <a:lnRef idx="1">
+            <a:schemeClr val="accent1"/>
+          </a:lnRef>
+          <a:fillRef idx="0">
+            <a:schemeClr val="accent1"/>
+          </a:fillRef>
+          <a:effectRef idx="0">
+            <a:schemeClr val="accent1"/>
+          </a:effectRef>
+          <a:fontRef idx="minor">
+            <a:schemeClr val="tx1"/>
+          </a:fontRef>
+        </p:style>
+      </p:cxnSp>
+      <p:cxnSp>
+        <p:nvCxnSpPr>
+          <p:cNvPr id="119" name="Straight Arrow Connector 118">
+            <a:extLst>
+              <a:ext uri="{FF2B5EF4-FFF2-40B4-BE49-F238E27FC236}">
+                <a16:creationId xmlns:a16="http://schemas.microsoft.com/office/drawing/2014/main" id="{4B153546-C88C-4D2C-BC2E-47D0D9060686}"/>
+              </a:ext>
+            </a:extLst>
+          </p:cNvPr>
+          <p:cNvCxnSpPr>
+            <a:cxnSpLocks/>
+            <a:endCxn id="116" idx="2"/>
+          </p:cNvCxnSpPr>
+          <p:nvPr/>
+        </p:nvCxnSpPr>
+        <p:spPr>
+          <a:xfrm>
+            <a:off x="5290982" y="6039402"/>
+            <a:ext cx="1128367" cy="27484"/>
+          </a:xfrm>
+          <a:prstGeom prst="straightConnector1">
+            <a:avLst/>
+          </a:prstGeom>
+          <a:ln w="19050">
+            <a:solidFill>
+              <a:srgbClr val="7030A0"/>
+            </a:solidFill>
+            <a:prstDash val="sysDash"/>
+            <a:headEnd type="arrow" w="med" len="med"/>
+            <a:tailEnd type="none" w="med" len="med"/>
+          </a:ln>
+        </p:spPr>
+        <p:style>
+          <a:lnRef idx="1">
+            <a:schemeClr val="accent1"/>
+          </a:lnRef>
+          <a:fillRef idx="0">
+            <a:schemeClr val="accent1"/>
+          </a:fillRef>
+          <a:effectRef idx="0">
+            <a:schemeClr val="accent1"/>
+          </a:effectRef>
+          <a:fontRef idx="minor">
+            <a:schemeClr val="tx1"/>
+          </a:fontRef>
+        </p:style>
+      </p:cxnSp>
+      <p:sp>
+        <p:nvSpPr>
+          <p:cNvPr id="123" name="Rectangle 122">
+            <a:extLst>
+              <a:ext uri="{FF2B5EF4-FFF2-40B4-BE49-F238E27FC236}">
+                <a16:creationId xmlns:a16="http://schemas.microsoft.com/office/drawing/2014/main" id="{7D8552E6-0E0A-43DA-9AEF-47D3AA295479}"/>
+              </a:ext>
+            </a:extLst>
+          </p:cNvPr>
+          <p:cNvSpPr/>
+          <p:nvPr/>
+        </p:nvSpPr>
+        <p:spPr>
+          <a:xfrm>
+            <a:off x="5157992" y="2252109"/>
+            <a:ext cx="132990" cy="3781308"/>
+          </a:xfrm>
+          <a:prstGeom prst="rect">
+            <a:avLst/>
+          </a:prstGeom>
+          <a:solidFill>
+            <a:srgbClr val="0070C0"/>
+          </a:solidFill>
+          <a:ln>
+            <a:solidFill>
+              <a:srgbClr val="0070C0"/>
+            </a:solidFill>
+          </a:ln>
+          <a:effectLst/>
+        </p:spPr>
+        <p:style>
+          <a:lnRef idx="1">
+            <a:schemeClr val="accent3"/>
+          </a:lnRef>
+          <a:fillRef idx="2">
+            <a:schemeClr val="accent3"/>
+          </a:fillRef>
+          <a:effectRef idx="1">
+            <a:schemeClr val="accent3"/>
+          </a:effectRef>
+          <a:fontRef idx="minor">
+            <a:schemeClr val="dk1"/>
+          </a:fontRef>
+        </p:style>
+        <p:txBody>
+          <a:bodyPr rtlCol="0" anchor="ctr"/>
+          <a:lstStyle/>
+          <a:p>
+            <a:pPr algn="ctr"/>
+            <a:endParaRPr lang="en-SG" sz="1050"/>
+          </a:p>
+        </p:txBody>
+      </p:sp>
+      <p:sp>
+        <p:nvSpPr>
+          <p:cNvPr id="124" name="Arrow: Curved Left 123">
+            <a:extLst>
+              <a:ext uri="{FF2B5EF4-FFF2-40B4-BE49-F238E27FC236}">
+                <a16:creationId xmlns:a16="http://schemas.microsoft.com/office/drawing/2014/main" id="{D09195F4-6136-47CA-A106-041B47E5106D}"/>
+              </a:ext>
+            </a:extLst>
+          </p:cNvPr>
+          <p:cNvSpPr/>
+          <p:nvPr/>
+        </p:nvSpPr>
+        <p:spPr>
+          <a:xfrm>
+            <a:off x="5200770" y="2089044"/>
+            <a:ext cx="354280" cy="309791"/>
+          </a:xfrm>
+          <a:prstGeom prst="curvedLeftArrow">
+            <a:avLst/>
+          </a:prstGeom>
+        </p:spPr>
+        <p:style>
+          <a:lnRef idx="2">
+            <a:schemeClr val="accent1">
+              <a:shade val="50000"/>
+            </a:schemeClr>
+          </a:lnRef>
+          <a:fillRef idx="1">
+            <a:schemeClr val="accent1"/>
+          </a:fillRef>
+          <a:effectRef idx="0">
+            <a:schemeClr val="accent1"/>
+          </a:effectRef>
+          <a:fontRef idx="minor">
+            <a:schemeClr val="lt1"/>
+          </a:fontRef>
+        </p:style>
+        <p:txBody>
+          <a:bodyPr rtlCol="0" anchor="ctr"/>
+          <a:lstStyle/>
+          <a:p>
+            <a:pPr algn="ctr"/>
+            <a:endParaRPr lang="en-SG">
+              <a:solidFill>
+                <a:schemeClr val="tx1"/>
+              </a:solidFill>
+            </a:endParaRPr>
+          </a:p>
+        </p:txBody>
+      </p:sp>
+      <p:sp>
+        <p:nvSpPr>
+          <p:cNvPr id="126" name="TextBox 125">
+            <a:extLst>
+              <a:ext uri="{FF2B5EF4-FFF2-40B4-BE49-F238E27FC236}">
+                <a16:creationId xmlns:a16="http://schemas.microsoft.com/office/drawing/2014/main" id="{D0B92837-DFC0-409D-8597-12C49D6991A0}"/>
+              </a:ext>
+            </a:extLst>
+          </p:cNvPr>
+          <p:cNvSpPr txBox="1"/>
+          <p:nvPr/>
+        </p:nvSpPr>
+        <p:spPr>
+          <a:xfrm>
+            <a:off x="5224075" y="1937049"/>
+            <a:ext cx="845715" cy="276999"/>
+          </a:xfrm>
+          <a:prstGeom prst="rect">
+            <a:avLst/>
+          </a:prstGeom>
+          <a:noFill/>
+        </p:spPr>
+        <p:txBody>
+          <a:bodyPr wrap="square" lIns="0" tIns="0" rIns="0" bIns="0" rtlCol="0">
+            <a:spAutoFit/>
+          </a:bodyPr>
+          <a:lstStyle>
+            <a:defPPr>
+              <a:defRPr lang="en-US"/>
+            </a:defPPr>
+            <a:lvl1pPr algn="r">
+              <a:defRPr sz="1400">
+                <a:solidFill>
+                  <a:srgbClr val="0070C0"/>
+                </a:solidFill>
+              </a:defRPr>
+            </a:lvl1pPr>
+          </a:lstStyle>
+          <a:p>
+            <a:r>
+              <a:rPr lang="en-US" sz="900" dirty="0" err="1">
+                <a:solidFill>
+                  <a:srgbClr val="7030A0"/>
+                </a:solidFill>
+              </a:rPr>
+              <a:t>performAttendanceTaking</a:t>
+            </a:r>
+            <a:r>
+              <a:rPr lang="en-US" sz="900" dirty="0">
+                <a:solidFill>
+                  <a:srgbClr val="7030A0"/>
+                </a:solidFill>
+              </a:rPr>
+              <a:t>()</a:t>
+            </a:r>
+            <a:endParaRPr lang="en-US" sz="900" dirty="0"/>
+          </a:p>
+        </p:txBody>
+      </p:sp>
     </p:spTree>
     <p:extLst>
       <p:ext uri="{BB962C8B-B14F-4D97-AF65-F5344CB8AC3E}">

</xml_diff>